<commit_message>
Dynamically get the AD/ADB tokens / workspace URL
</commit_message>
<xml_diff>
--- a/Databricks Dev Ops.pptx
+++ b/Databricks Dev Ops.pptx
@@ -6,6 +6,9 @@
   </p:sldMasterIdLst>
   <p:sldIdLst>
     <p:sldId id="256" r:id="rId5"/>
+    <p:sldId id="257" r:id="rId6"/>
+    <p:sldId id="259" r:id="rId7"/>
+    <p:sldId id="258" r:id="rId8"/>
   </p:sldIdLst>
   <p:sldSz cx="12192000" cy="6858000"/>
   <p:notesSz cx="6858000" cy="9144000"/>
@@ -2657,7 +2660,7 @@
           <a:p>
             <a:fld id="{D7A2CEBF-19A8-45A4-87F4-7E255B5A8DA3}" type="datetimeFigureOut">
               <a:rPr lang="en-US" smtClean="0"/>
-              <a:t>7/23/2020</a:t>
+              <a:t>7/24/2020</a:t>
             </a:fld>
             <a:endParaRPr lang="en-US" dirty="0"/>
           </a:p>
@@ -2855,7 +2858,7 @@
           <a:p>
             <a:fld id="{D7A2CEBF-19A8-45A4-87F4-7E255B5A8DA3}" type="datetimeFigureOut">
               <a:rPr lang="en-US" smtClean="0"/>
-              <a:t>7/23/2020</a:t>
+              <a:t>7/24/2020</a:t>
             </a:fld>
             <a:endParaRPr lang="en-US" dirty="0"/>
           </a:p>
@@ -3063,7 +3066,7 @@
           <a:p>
             <a:fld id="{D7A2CEBF-19A8-45A4-87F4-7E255B5A8DA3}" type="datetimeFigureOut">
               <a:rPr lang="en-US" smtClean="0"/>
-              <a:t>7/23/2020</a:t>
+              <a:t>7/24/2020</a:t>
             </a:fld>
             <a:endParaRPr lang="en-US" dirty="0"/>
           </a:p>
@@ -3261,7 +3264,7 @@
           <a:p>
             <a:fld id="{D7A2CEBF-19A8-45A4-87F4-7E255B5A8DA3}" type="datetimeFigureOut">
               <a:rPr lang="en-US" smtClean="0"/>
-              <a:t>7/23/2020</a:t>
+              <a:t>7/24/2020</a:t>
             </a:fld>
             <a:endParaRPr lang="en-US" dirty="0"/>
           </a:p>
@@ -3536,7 +3539,7 @@
           <a:p>
             <a:fld id="{D7A2CEBF-19A8-45A4-87F4-7E255B5A8DA3}" type="datetimeFigureOut">
               <a:rPr lang="en-US" smtClean="0"/>
-              <a:t>7/23/2020</a:t>
+              <a:t>7/24/2020</a:t>
             </a:fld>
             <a:endParaRPr lang="en-US" dirty="0"/>
           </a:p>
@@ -3801,7 +3804,7 @@
           <a:p>
             <a:fld id="{D7A2CEBF-19A8-45A4-87F4-7E255B5A8DA3}" type="datetimeFigureOut">
               <a:rPr lang="en-US" smtClean="0"/>
-              <a:t>7/23/2020</a:t>
+              <a:t>7/24/2020</a:t>
             </a:fld>
             <a:endParaRPr lang="en-US" dirty="0"/>
           </a:p>
@@ -4213,7 +4216,7 @@
           <a:p>
             <a:fld id="{D7A2CEBF-19A8-45A4-87F4-7E255B5A8DA3}" type="datetimeFigureOut">
               <a:rPr lang="en-US" smtClean="0"/>
-              <a:t>7/23/2020</a:t>
+              <a:t>7/24/2020</a:t>
             </a:fld>
             <a:endParaRPr lang="en-US" dirty="0"/>
           </a:p>
@@ -4354,7 +4357,7 @@
           <a:p>
             <a:fld id="{D7A2CEBF-19A8-45A4-87F4-7E255B5A8DA3}" type="datetimeFigureOut">
               <a:rPr lang="en-US" smtClean="0"/>
-              <a:t>7/23/2020</a:t>
+              <a:t>7/24/2020</a:t>
             </a:fld>
             <a:endParaRPr lang="en-US" dirty="0"/>
           </a:p>
@@ -4467,7 +4470,7 @@
           <a:p>
             <a:fld id="{D7A2CEBF-19A8-45A4-87F4-7E255B5A8DA3}" type="datetimeFigureOut">
               <a:rPr lang="en-US" smtClean="0"/>
-              <a:t>7/23/2020</a:t>
+              <a:t>7/24/2020</a:t>
             </a:fld>
             <a:endParaRPr lang="en-US" dirty="0"/>
           </a:p>
@@ -4778,7 +4781,7 @@
           <a:p>
             <a:fld id="{D7A2CEBF-19A8-45A4-87F4-7E255B5A8DA3}" type="datetimeFigureOut">
               <a:rPr lang="en-US" smtClean="0"/>
-              <a:t>7/23/2020</a:t>
+              <a:t>7/24/2020</a:t>
             </a:fld>
             <a:endParaRPr lang="en-US" dirty="0"/>
           </a:p>
@@ -5066,7 +5069,7 @@
           <a:p>
             <a:fld id="{D7A2CEBF-19A8-45A4-87F4-7E255B5A8DA3}" type="datetimeFigureOut">
               <a:rPr lang="en-US" smtClean="0"/>
-              <a:t>7/23/2020</a:t>
+              <a:t>7/24/2020</a:t>
             </a:fld>
             <a:endParaRPr lang="en-US" dirty="0"/>
           </a:p>
@@ -5307,7 +5310,7 @@
           <a:p>
             <a:fld id="{D7A2CEBF-19A8-45A4-87F4-7E255B5A8DA3}" type="datetimeFigureOut">
               <a:rPr lang="en-US" smtClean="0"/>
-              <a:t>7/23/2020</a:t>
+              <a:t>7/24/2020</a:t>
             </a:fld>
             <a:endParaRPr lang="en-US" dirty="0"/>
           </a:p>
@@ -7860,6 +7863,1625 @@
 </p:sld>
 </file>
 
+<file path=ppt/slides/slide2.xml><?xml version="1.0" encoding="utf-8"?>
+<p:sld xmlns:a="http://schemas.openxmlformats.org/drawingml/2006/main" xmlns:r="http://schemas.openxmlformats.org/officeDocument/2006/relationships" xmlns:p="http://schemas.openxmlformats.org/presentationml/2006/main">
+  <p:cSld>
+    <p:spTree>
+      <p:nvGrpSpPr>
+        <p:cNvPr id="1" name=""/>
+        <p:cNvGrpSpPr/>
+        <p:nvPr/>
+      </p:nvGrpSpPr>
+      <p:grpSpPr>
+        <a:xfrm>
+          <a:off x="0" y="0"/>
+          <a:ext cx="0" cy="0"/>
+          <a:chOff x="0" y="0"/>
+          <a:chExt cx="0" cy="0"/>
+        </a:xfrm>
+      </p:grpSpPr>
+      <p:sp>
+        <p:nvSpPr>
+          <p:cNvPr id="33" name="Title 1">
+            <a:extLst>
+              <a:ext uri="{FF2B5EF4-FFF2-40B4-BE49-F238E27FC236}">
+                <a16:creationId xmlns:a16="http://schemas.microsoft.com/office/drawing/2014/main" id="{E5AA6774-BAB0-435D-B549-E23323D367BB}"/>
+              </a:ext>
+            </a:extLst>
+          </p:cNvPr>
+          <p:cNvSpPr>
+            <a:spLocks noGrp="1"/>
+          </p:cNvSpPr>
+          <p:nvPr>
+            <p:ph type="ctrTitle"/>
+          </p:nvPr>
+        </p:nvSpPr>
+        <p:spPr>
+          <a:xfrm>
+            <a:off x="189471" y="125584"/>
+            <a:ext cx="9144000" cy="549918"/>
+          </a:xfrm>
+        </p:spPr>
+        <p:txBody>
+          <a:bodyPr>
+            <a:noAutofit/>
+          </a:bodyPr>
+          <a:lstStyle/>
+          <a:p>
+            <a:pPr algn="l"/>
+            <a:r>
+              <a:rPr lang="en-US" sz="2800" dirty="0"/>
+              <a:t>Databricks Dev Ops</a:t>
+            </a:r>
+          </a:p>
+        </p:txBody>
+      </p:sp>
+      <p:sp>
+        <p:nvSpPr>
+          <p:cNvPr id="35" name="Subtitle 2">
+            <a:extLst>
+              <a:ext uri="{FF2B5EF4-FFF2-40B4-BE49-F238E27FC236}">
+                <a16:creationId xmlns:a16="http://schemas.microsoft.com/office/drawing/2014/main" id="{C5F6A37E-104C-4A01-BF62-36779E32047C}"/>
+              </a:ext>
+            </a:extLst>
+          </p:cNvPr>
+          <p:cNvSpPr txBox="1">
+            <a:spLocks/>
+          </p:cNvSpPr>
+          <p:nvPr/>
+        </p:nvSpPr>
+        <p:spPr>
+          <a:xfrm>
+            <a:off x="296130" y="570261"/>
+            <a:ext cx="11211698" cy="331529"/>
+          </a:xfrm>
+          <a:prstGeom prst="rect">
+            <a:avLst/>
+          </a:prstGeom>
+        </p:spPr>
+        <p:txBody>
+          <a:bodyPr vert="horz" lIns="91440" tIns="45720" rIns="91440" bIns="45720" rtlCol="0">
+            <a:normAutofit/>
+          </a:bodyPr>
+          <a:lstStyle>
+            <a:lvl1pPr marL="0" indent="0" algn="ctr" defTabSz="914400" rtl="0" eaLnBrk="1" latinLnBrk="0" hangingPunct="1">
+              <a:lnSpc>
+                <a:spcPct val="90000"/>
+              </a:lnSpc>
+              <a:spcBef>
+                <a:spcPts val="1000"/>
+              </a:spcBef>
+              <a:buFont typeface="Arial" panose="020B0604020202020204" pitchFamily="34" charset="0"/>
+              <a:buNone/>
+              <a:defRPr sz="2400" kern="1200">
+                <a:solidFill>
+                  <a:schemeClr val="tx1"/>
+                </a:solidFill>
+                <a:latin typeface="+mn-lt"/>
+                <a:ea typeface="+mn-ea"/>
+                <a:cs typeface="+mn-cs"/>
+              </a:defRPr>
+            </a:lvl1pPr>
+            <a:lvl2pPr marL="457200" indent="0" algn="ctr" defTabSz="914400" rtl="0" eaLnBrk="1" latinLnBrk="0" hangingPunct="1">
+              <a:lnSpc>
+                <a:spcPct val="90000"/>
+              </a:lnSpc>
+              <a:spcBef>
+                <a:spcPts val="500"/>
+              </a:spcBef>
+              <a:buFont typeface="Arial" panose="020B0604020202020204" pitchFamily="34" charset="0"/>
+              <a:buNone/>
+              <a:defRPr sz="2000" kern="1200">
+                <a:solidFill>
+                  <a:schemeClr val="tx1"/>
+                </a:solidFill>
+                <a:latin typeface="+mn-lt"/>
+                <a:ea typeface="+mn-ea"/>
+                <a:cs typeface="+mn-cs"/>
+              </a:defRPr>
+            </a:lvl2pPr>
+            <a:lvl3pPr marL="914400" indent="0" algn="ctr" defTabSz="914400" rtl="0" eaLnBrk="1" latinLnBrk="0" hangingPunct="1">
+              <a:lnSpc>
+                <a:spcPct val="90000"/>
+              </a:lnSpc>
+              <a:spcBef>
+                <a:spcPts val="500"/>
+              </a:spcBef>
+              <a:buFont typeface="Arial" panose="020B0604020202020204" pitchFamily="34" charset="0"/>
+              <a:buNone/>
+              <a:defRPr sz="1800" kern="1200">
+                <a:solidFill>
+                  <a:schemeClr val="tx1"/>
+                </a:solidFill>
+                <a:latin typeface="+mn-lt"/>
+                <a:ea typeface="+mn-ea"/>
+                <a:cs typeface="+mn-cs"/>
+              </a:defRPr>
+            </a:lvl3pPr>
+            <a:lvl4pPr marL="1371600" indent="0" algn="ctr" defTabSz="914400" rtl="0" eaLnBrk="1" latinLnBrk="0" hangingPunct="1">
+              <a:lnSpc>
+                <a:spcPct val="90000"/>
+              </a:lnSpc>
+              <a:spcBef>
+                <a:spcPts val="500"/>
+              </a:spcBef>
+              <a:buFont typeface="Arial" panose="020B0604020202020204" pitchFamily="34" charset="0"/>
+              <a:buNone/>
+              <a:defRPr sz="1600" kern="1200">
+                <a:solidFill>
+                  <a:schemeClr val="tx1"/>
+                </a:solidFill>
+                <a:latin typeface="+mn-lt"/>
+                <a:ea typeface="+mn-ea"/>
+                <a:cs typeface="+mn-cs"/>
+              </a:defRPr>
+            </a:lvl4pPr>
+            <a:lvl5pPr marL="1828800" indent="0" algn="ctr" defTabSz="914400" rtl="0" eaLnBrk="1" latinLnBrk="0" hangingPunct="1">
+              <a:lnSpc>
+                <a:spcPct val="90000"/>
+              </a:lnSpc>
+              <a:spcBef>
+                <a:spcPts val="500"/>
+              </a:spcBef>
+              <a:buFont typeface="Arial" panose="020B0604020202020204" pitchFamily="34" charset="0"/>
+              <a:buNone/>
+              <a:defRPr sz="1600" kern="1200">
+                <a:solidFill>
+                  <a:schemeClr val="tx1"/>
+                </a:solidFill>
+                <a:latin typeface="+mn-lt"/>
+                <a:ea typeface="+mn-ea"/>
+                <a:cs typeface="+mn-cs"/>
+              </a:defRPr>
+            </a:lvl5pPr>
+            <a:lvl6pPr marL="2286000" indent="0" algn="ctr" defTabSz="914400" rtl="0" eaLnBrk="1" latinLnBrk="0" hangingPunct="1">
+              <a:lnSpc>
+                <a:spcPct val="90000"/>
+              </a:lnSpc>
+              <a:spcBef>
+                <a:spcPts val="500"/>
+              </a:spcBef>
+              <a:buFont typeface="Arial" panose="020B0604020202020204" pitchFamily="34" charset="0"/>
+              <a:buNone/>
+              <a:defRPr sz="1600" kern="1200">
+                <a:solidFill>
+                  <a:schemeClr val="tx1"/>
+                </a:solidFill>
+                <a:latin typeface="+mn-lt"/>
+                <a:ea typeface="+mn-ea"/>
+                <a:cs typeface="+mn-cs"/>
+              </a:defRPr>
+            </a:lvl6pPr>
+            <a:lvl7pPr marL="2743200" indent="0" algn="ctr" defTabSz="914400" rtl="0" eaLnBrk="1" latinLnBrk="0" hangingPunct="1">
+              <a:lnSpc>
+                <a:spcPct val="90000"/>
+              </a:lnSpc>
+              <a:spcBef>
+                <a:spcPts val="500"/>
+              </a:spcBef>
+              <a:buFont typeface="Arial" panose="020B0604020202020204" pitchFamily="34" charset="0"/>
+              <a:buNone/>
+              <a:defRPr sz="1600" kern="1200">
+                <a:solidFill>
+                  <a:schemeClr val="tx1"/>
+                </a:solidFill>
+                <a:latin typeface="+mn-lt"/>
+                <a:ea typeface="+mn-ea"/>
+                <a:cs typeface="+mn-cs"/>
+              </a:defRPr>
+            </a:lvl7pPr>
+            <a:lvl8pPr marL="3200400" indent="0" algn="ctr" defTabSz="914400" rtl="0" eaLnBrk="1" latinLnBrk="0" hangingPunct="1">
+              <a:lnSpc>
+                <a:spcPct val="90000"/>
+              </a:lnSpc>
+              <a:spcBef>
+                <a:spcPts val="500"/>
+              </a:spcBef>
+              <a:buFont typeface="Arial" panose="020B0604020202020204" pitchFamily="34" charset="0"/>
+              <a:buNone/>
+              <a:defRPr sz="1600" kern="1200">
+                <a:solidFill>
+                  <a:schemeClr val="tx1"/>
+                </a:solidFill>
+                <a:latin typeface="+mn-lt"/>
+                <a:ea typeface="+mn-ea"/>
+                <a:cs typeface="+mn-cs"/>
+              </a:defRPr>
+            </a:lvl8pPr>
+            <a:lvl9pPr marL="3657600" indent="0" algn="ctr" defTabSz="914400" rtl="0" eaLnBrk="1" latinLnBrk="0" hangingPunct="1">
+              <a:lnSpc>
+                <a:spcPct val="90000"/>
+              </a:lnSpc>
+              <a:spcBef>
+                <a:spcPts val="500"/>
+              </a:spcBef>
+              <a:buFont typeface="Arial" panose="020B0604020202020204" pitchFamily="34" charset="0"/>
+              <a:buNone/>
+              <a:defRPr sz="1600" kern="1200">
+                <a:solidFill>
+                  <a:schemeClr val="tx1"/>
+                </a:solidFill>
+                <a:latin typeface="+mn-lt"/>
+                <a:ea typeface="+mn-ea"/>
+                <a:cs typeface="+mn-cs"/>
+              </a:defRPr>
+            </a:lvl9pPr>
+          </a:lstStyle>
+          <a:p>
+            <a:pPr algn="l"/>
+            <a:r>
+              <a:rPr lang="en-US" sz="1600" dirty="0"/>
+              <a:t>Goal: Work with Databricks under source controls and fully automated deployments</a:t>
+            </a:r>
+          </a:p>
+        </p:txBody>
+      </p:sp>
+      <p:sp>
+        <p:nvSpPr>
+          <p:cNvPr id="17" name="TextBox 16">
+            <a:extLst>
+              <a:ext uri="{FF2B5EF4-FFF2-40B4-BE49-F238E27FC236}">
+                <a16:creationId xmlns:a16="http://schemas.microsoft.com/office/drawing/2014/main" id="{57D3E6D5-E43F-4376-8B5C-982E0F619D00}"/>
+              </a:ext>
+            </a:extLst>
+          </p:cNvPr>
+          <p:cNvSpPr txBox="1"/>
+          <p:nvPr/>
+        </p:nvSpPr>
+        <p:spPr>
+          <a:xfrm>
+            <a:off x="412028" y="1179578"/>
+            <a:ext cx="6844506" cy="5878532"/>
+          </a:xfrm>
+          <a:prstGeom prst="rect">
+            <a:avLst/>
+          </a:prstGeom>
+          <a:noFill/>
+        </p:spPr>
+        <p:txBody>
+          <a:bodyPr wrap="square" rtlCol="0">
+            <a:spAutoFit/>
+          </a:bodyPr>
+          <a:lstStyle/>
+          <a:p>
+            <a:r>
+              <a:rPr lang="en-US" sz="1400" dirty="0"/>
+              <a:t>Old Way</a:t>
+            </a:r>
+          </a:p>
+          <a:p>
+            <a:pPr marL="342900" indent="-342900">
+              <a:buFont typeface="Arial" panose="020B0604020202020204" pitchFamily="34" charset="0"/>
+              <a:buChar char="•"/>
+            </a:pPr>
+            <a:r>
+              <a:rPr lang="en-US" sz="1200" dirty="0"/>
+              <a:t>Save notebooks to Git /</a:t>
+            </a:r>
+            <a:r>
+              <a:rPr lang="en-US" sz="1200" dirty="0" err="1"/>
+              <a:t>MyProject</a:t>
+            </a:r>
+            <a:endParaRPr lang="en-US" sz="1200" dirty="0"/>
+          </a:p>
+          <a:p>
+            <a:endParaRPr lang="en-US" sz="1200" dirty="0"/>
+          </a:p>
+          <a:p>
+            <a:r>
+              <a:rPr lang="en-US" sz="1400" dirty="0"/>
+              <a:t>New Way</a:t>
+            </a:r>
+          </a:p>
+          <a:p>
+            <a:pPr marL="171450" indent="-171450">
+              <a:buFont typeface="Arial" panose="020B0604020202020204" pitchFamily="34" charset="0"/>
+              <a:buChar char="•"/>
+            </a:pPr>
+            <a:r>
+              <a:rPr lang="en-US" sz="1200" dirty="0" err="1"/>
+              <a:t>Ttt</a:t>
+            </a:r>
+            <a:endParaRPr lang="en-US" sz="1200" dirty="0"/>
+          </a:p>
+          <a:p>
+            <a:pPr marL="171450" indent="-171450">
+              <a:buFont typeface="Arial" panose="020B0604020202020204" pitchFamily="34" charset="0"/>
+              <a:buChar char="•"/>
+            </a:pPr>
+            <a:endParaRPr lang="en-US" sz="1200" dirty="0"/>
+          </a:p>
+          <a:p>
+            <a:pPr marL="171450" indent="-171450">
+              <a:buFont typeface="Arial" panose="020B0604020202020204" pitchFamily="34" charset="0"/>
+              <a:buChar char="•"/>
+            </a:pPr>
+            <a:endParaRPr lang="en-US" sz="1200" dirty="0"/>
+          </a:p>
+          <a:p>
+            <a:r>
+              <a:rPr lang="en-US" sz="1200" dirty="0"/>
+              <a:t>Steps</a:t>
+            </a:r>
+          </a:p>
+          <a:p>
+            <a:pPr marL="228600" indent="-228600">
+              <a:buFont typeface="+mj-lt"/>
+              <a:buAutoNum type="arabicPeriod"/>
+            </a:pPr>
+            <a:r>
+              <a:rPr lang="en-US" sz="1200" dirty="0"/>
+              <a:t>Parameter: Folder in Databricks?</a:t>
+            </a:r>
+          </a:p>
+          <a:p>
+            <a:pPr marL="228600" indent="-228600">
+              <a:buFont typeface="+mj-lt"/>
+              <a:buAutoNum type="arabicPeriod"/>
+            </a:pPr>
+            <a:r>
+              <a:rPr lang="en-US" sz="1200" dirty="0"/>
+              <a:t>Parameter: Where in source control? (assuming not recursive)</a:t>
+            </a:r>
+          </a:p>
+          <a:p>
+            <a:pPr marL="228600" indent="-228600">
+              <a:buFont typeface="+mj-lt"/>
+              <a:buAutoNum type="arabicPeriod"/>
+            </a:pPr>
+            <a:r>
+              <a:rPr lang="en-US" sz="1200" dirty="0"/>
+              <a:t>Create the folder in ADB</a:t>
+            </a:r>
+          </a:p>
+          <a:p>
+            <a:pPr marL="228600" indent="-228600">
+              <a:buFont typeface="+mj-lt"/>
+              <a:buAutoNum type="arabicPeriod"/>
+            </a:pPr>
+            <a:r>
+              <a:rPr lang="en-US" sz="1200" dirty="0"/>
+              <a:t>Deploy from source control to ADB folder</a:t>
+            </a:r>
+          </a:p>
+          <a:p>
+            <a:pPr marL="228600" indent="-228600">
+              <a:buFont typeface="+mj-lt"/>
+              <a:buAutoNum type="arabicPeriod"/>
+            </a:pPr>
+            <a:endParaRPr lang="en-US" sz="1200" dirty="0"/>
+          </a:p>
+          <a:p>
+            <a:pPr marL="228600" indent="-228600">
+              <a:buFont typeface="+mj-lt"/>
+              <a:buAutoNum type="arabicPeriod"/>
+            </a:pPr>
+            <a:endParaRPr lang="en-US" sz="1200" dirty="0"/>
+          </a:p>
+          <a:p>
+            <a:r>
+              <a:rPr lang="en-US" sz="1200" dirty="0"/>
+              <a:t>People</a:t>
+            </a:r>
+          </a:p>
+          <a:p>
+            <a:pPr marL="171450" indent="-171450">
+              <a:buFont typeface="Arial" panose="020B0604020202020204" pitchFamily="34" charset="0"/>
+              <a:buChar char="•"/>
+            </a:pPr>
+            <a:r>
+              <a:rPr lang="en-US" sz="1200" dirty="0"/>
+              <a:t>Work in their user's folder</a:t>
+            </a:r>
+          </a:p>
+          <a:p>
+            <a:pPr marL="171450" indent="-171450">
+              <a:buFont typeface="Arial" panose="020B0604020202020204" pitchFamily="34" charset="0"/>
+              <a:buChar char="•"/>
+            </a:pPr>
+            <a:r>
+              <a:rPr lang="en-US" sz="1200" dirty="0"/>
+              <a:t>Map to source control project “common folder”?</a:t>
+            </a:r>
+          </a:p>
+          <a:p>
+            <a:pPr marL="171450" indent="-171450">
+              <a:buFont typeface="Arial" panose="020B0604020202020204" pitchFamily="34" charset="0"/>
+              <a:buChar char="•"/>
+            </a:pPr>
+            <a:endParaRPr lang="en-US" sz="1200" dirty="0"/>
+          </a:p>
+          <a:p>
+            <a:pPr marL="171450" indent="-171450">
+              <a:buFont typeface="Arial" panose="020B0604020202020204" pitchFamily="34" charset="0"/>
+              <a:buChar char="•"/>
+            </a:pPr>
+            <a:endParaRPr lang="en-US" sz="1200" dirty="0"/>
+          </a:p>
+          <a:p>
+            <a:pPr marL="171450" indent="-171450">
+              <a:buFont typeface="Arial" panose="020B0604020202020204" pitchFamily="34" charset="0"/>
+              <a:buChar char="•"/>
+            </a:pPr>
+            <a:endParaRPr lang="en-US" sz="1200" dirty="0"/>
+          </a:p>
+          <a:p>
+            <a:r>
+              <a:rPr lang="en-US" sz="1200" dirty="0"/>
+              <a:t>Users folder</a:t>
+            </a:r>
+          </a:p>
+          <a:p>
+            <a:pPr marL="171450" indent="-171450">
+              <a:buFont typeface="Arial" panose="020B0604020202020204" pitchFamily="34" charset="0"/>
+              <a:buChar char="•"/>
+            </a:pPr>
+            <a:r>
+              <a:rPr lang="en-US" sz="1200" dirty="0"/>
+              <a:t>For testing code by users (mapped to source control under username/notebook-name</a:t>
+            </a:r>
+          </a:p>
+          <a:p>
+            <a:endParaRPr lang="en-US" sz="1200" dirty="0"/>
+          </a:p>
+          <a:p>
+            <a:r>
+              <a:rPr lang="en-US" sz="1200" dirty="0"/>
+              <a:t>Real code</a:t>
+            </a:r>
+          </a:p>
+          <a:p>
+            <a:pPr marL="171450" indent="-171450">
+              <a:buFont typeface="Arial" panose="020B0604020202020204" pitchFamily="34" charset="0"/>
+              <a:buChar char="•"/>
+            </a:pPr>
+            <a:r>
+              <a:rPr lang="en-US" sz="1200" dirty="0"/>
+              <a:t>Move your notebook (or clone) to a folder off the root (e.g. /MyProject-1/notebook-name)</a:t>
+            </a:r>
+          </a:p>
+          <a:p>
+            <a:pPr marL="171450" indent="-171450">
+              <a:buFont typeface="Arial" panose="020B0604020202020204" pitchFamily="34" charset="0"/>
+              <a:buChar char="•"/>
+            </a:pPr>
+            <a:r>
+              <a:rPr lang="en-US" sz="1200" dirty="0"/>
+              <a:t>Should we have many different projects or subfolders </a:t>
+            </a:r>
+          </a:p>
+          <a:p>
+            <a:pPr marL="171450" indent="-171450">
+              <a:buFont typeface="Arial" panose="020B0604020202020204" pitchFamily="34" charset="0"/>
+              <a:buChar char="•"/>
+            </a:pPr>
+            <a:r>
+              <a:rPr lang="en-US" sz="1200" dirty="0"/>
+              <a:t>Create folders????  Map to ADB</a:t>
+            </a:r>
+          </a:p>
+          <a:p>
+            <a:pPr marL="171450" indent="-171450">
+              <a:buFont typeface="Arial" panose="020B0604020202020204" pitchFamily="34" charset="0"/>
+              <a:buChar char="•"/>
+            </a:pPr>
+            <a:r>
+              <a:rPr lang="en-US" sz="1200" dirty="0"/>
+              <a:t>MOVE: Maintains Git</a:t>
+            </a:r>
+          </a:p>
+          <a:p>
+            <a:pPr marL="171450" indent="-171450">
+              <a:buFont typeface="Arial" panose="020B0604020202020204" pitchFamily="34" charset="0"/>
+              <a:buChar char="•"/>
+            </a:pPr>
+            <a:r>
+              <a:rPr lang="en-US" sz="1200" dirty="0"/>
+              <a:t>CLONE: Relink (relink to Git u could put in proper path)</a:t>
+            </a:r>
+          </a:p>
+          <a:p>
+            <a:pPr marL="171450" indent="-171450">
+              <a:buFont typeface="Arial" panose="020B0604020202020204" pitchFamily="34" charset="0"/>
+              <a:buChar char="•"/>
+            </a:pPr>
+            <a:endParaRPr lang="en-US" sz="1200" dirty="0"/>
+          </a:p>
+          <a:p>
+            <a:pPr marL="171450" indent="-171450">
+              <a:buFont typeface="Arial" panose="020B0604020202020204" pitchFamily="34" charset="0"/>
+              <a:buChar char="•"/>
+            </a:pPr>
+            <a:endParaRPr lang="en-US" sz="1200" dirty="0"/>
+          </a:p>
+        </p:txBody>
+      </p:sp>
+      <p:sp>
+        <p:nvSpPr>
+          <p:cNvPr id="3" name="TextBox 2">
+            <a:extLst>
+              <a:ext uri="{FF2B5EF4-FFF2-40B4-BE49-F238E27FC236}">
+                <a16:creationId xmlns:a16="http://schemas.microsoft.com/office/drawing/2014/main" id="{7E78C5CA-FDD7-4A89-820B-0618A956CF63}"/>
+              </a:ext>
+            </a:extLst>
+          </p:cNvPr>
+          <p:cNvSpPr txBox="1"/>
+          <p:nvPr/>
+        </p:nvSpPr>
+        <p:spPr>
+          <a:xfrm>
+            <a:off x="7814512" y="1732547"/>
+            <a:ext cx="3573378" cy="1754326"/>
+          </a:xfrm>
+          <a:prstGeom prst="rect">
+            <a:avLst/>
+          </a:prstGeom>
+          <a:noFill/>
+        </p:spPr>
+        <p:txBody>
+          <a:bodyPr wrap="square" rtlCol="0">
+            <a:spAutoFit/>
+          </a:bodyPr>
+          <a:lstStyle/>
+          <a:p>
+            <a:r>
+              <a:rPr lang="en-US" dirty="0"/>
+              <a:t>One folder for all your notebooks and subfolders.  Deploy the top </a:t>
+            </a:r>
+            <a:r>
+              <a:rPr lang="en-US" dirty="0" err="1"/>
+              <a:t>leve</a:t>
+            </a:r>
+            <a:r>
+              <a:rPr lang="en-US" dirty="0"/>
+              <a:t> and that would deploy the rest.</a:t>
+            </a:r>
+          </a:p>
+          <a:p>
+            <a:endParaRPr lang="en-US" dirty="0"/>
+          </a:p>
+          <a:p>
+            <a:r>
+              <a:rPr lang="en-US" dirty="0"/>
+              <a:t>IF you want many top level folder u edit the </a:t>
+            </a:r>
+            <a:r>
+              <a:rPr lang="en-US" dirty="0" err="1"/>
+              <a:t>pipeline.yml</a:t>
+            </a:r>
+            <a:endParaRPr lang="en-US" dirty="0"/>
+          </a:p>
+        </p:txBody>
+      </p:sp>
+    </p:spTree>
+    <p:extLst>
+      <p:ext uri="{BB962C8B-B14F-4D97-AF65-F5344CB8AC3E}">
+        <p14:creationId xmlns:p14="http://schemas.microsoft.com/office/powerpoint/2010/main" val="3585610815"/>
+      </p:ext>
+    </p:extLst>
+  </p:cSld>
+  <p:clrMapOvr>
+    <a:masterClrMapping/>
+  </p:clrMapOvr>
+</p:sld>
+</file>
+
+<file path=ppt/slides/slide3.xml><?xml version="1.0" encoding="utf-8"?>
+<p:sld xmlns:a="http://schemas.openxmlformats.org/drawingml/2006/main" xmlns:r="http://schemas.openxmlformats.org/officeDocument/2006/relationships" xmlns:p="http://schemas.openxmlformats.org/presentationml/2006/main">
+  <p:cSld>
+    <p:spTree>
+      <p:nvGrpSpPr>
+        <p:cNvPr id="1" name=""/>
+        <p:cNvGrpSpPr/>
+        <p:nvPr/>
+      </p:nvGrpSpPr>
+      <p:grpSpPr>
+        <a:xfrm>
+          <a:off x="0" y="0"/>
+          <a:ext cx="0" cy="0"/>
+          <a:chOff x="0" y="0"/>
+          <a:chExt cx="0" cy="0"/>
+        </a:xfrm>
+      </p:grpSpPr>
+      <p:sp>
+        <p:nvSpPr>
+          <p:cNvPr id="33" name="Title 1">
+            <a:extLst>
+              <a:ext uri="{FF2B5EF4-FFF2-40B4-BE49-F238E27FC236}">
+                <a16:creationId xmlns:a16="http://schemas.microsoft.com/office/drawing/2014/main" id="{E5AA6774-BAB0-435D-B549-E23323D367BB}"/>
+              </a:ext>
+            </a:extLst>
+          </p:cNvPr>
+          <p:cNvSpPr>
+            <a:spLocks noGrp="1"/>
+          </p:cNvSpPr>
+          <p:nvPr>
+            <p:ph type="ctrTitle"/>
+          </p:nvPr>
+        </p:nvSpPr>
+        <p:spPr>
+          <a:xfrm>
+            <a:off x="189471" y="125584"/>
+            <a:ext cx="9144000" cy="549918"/>
+          </a:xfrm>
+        </p:spPr>
+        <p:txBody>
+          <a:bodyPr>
+            <a:noAutofit/>
+          </a:bodyPr>
+          <a:lstStyle/>
+          <a:p>
+            <a:pPr algn="l"/>
+            <a:r>
+              <a:rPr lang="en-US" sz="2800" dirty="0"/>
+              <a:t>Databricks Dev Ops</a:t>
+            </a:r>
+          </a:p>
+        </p:txBody>
+      </p:sp>
+      <p:sp>
+        <p:nvSpPr>
+          <p:cNvPr id="35" name="Subtitle 2">
+            <a:extLst>
+              <a:ext uri="{FF2B5EF4-FFF2-40B4-BE49-F238E27FC236}">
+                <a16:creationId xmlns:a16="http://schemas.microsoft.com/office/drawing/2014/main" id="{C5F6A37E-104C-4A01-BF62-36779E32047C}"/>
+              </a:ext>
+            </a:extLst>
+          </p:cNvPr>
+          <p:cNvSpPr txBox="1">
+            <a:spLocks/>
+          </p:cNvSpPr>
+          <p:nvPr/>
+        </p:nvSpPr>
+        <p:spPr>
+          <a:xfrm>
+            <a:off x="296130" y="570261"/>
+            <a:ext cx="11211698" cy="331529"/>
+          </a:xfrm>
+          <a:prstGeom prst="rect">
+            <a:avLst/>
+          </a:prstGeom>
+        </p:spPr>
+        <p:txBody>
+          <a:bodyPr vert="horz" lIns="91440" tIns="45720" rIns="91440" bIns="45720" rtlCol="0">
+            <a:normAutofit/>
+          </a:bodyPr>
+          <a:lstStyle>
+            <a:lvl1pPr marL="0" indent="0" algn="ctr" defTabSz="914400" rtl="0" eaLnBrk="1" latinLnBrk="0" hangingPunct="1">
+              <a:lnSpc>
+                <a:spcPct val="90000"/>
+              </a:lnSpc>
+              <a:spcBef>
+                <a:spcPts val="1000"/>
+              </a:spcBef>
+              <a:buFont typeface="Arial" panose="020B0604020202020204" pitchFamily="34" charset="0"/>
+              <a:buNone/>
+              <a:defRPr sz="2400" kern="1200">
+                <a:solidFill>
+                  <a:schemeClr val="tx1"/>
+                </a:solidFill>
+                <a:latin typeface="+mn-lt"/>
+                <a:ea typeface="+mn-ea"/>
+                <a:cs typeface="+mn-cs"/>
+              </a:defRPr>
+            </a:lvl1pPr>
+            <a:lvl2pPr marL="457200" indent="0" algn="ctr" defTabSz="914400" rtl="0" eaLnBrk="1" latinLnBrk="0" hangingPunct="1">
+              <a:lnSpc>
+                <a:spcPct val="90000"/>
+              </a:lnSpc>
+              <a:spcBef>
+                <a:spcPts val="500"/>
+              </a:spcBef>
+              <a:buFont typeface="Arial" panose="020B0604020202020204" pitchFamily="34" charset="0"/>
+              <a:buNone/>
+              <a:defRPr sz="2000" kern="1200">
+                <a:solidFill>
+                  <a:schemeClr val="tx1"/>
+                </a:solidFill>
+                <a:latin typeface="+mn-lt"/>
+                <a:ea typeface="+mn-ea"/>
+                <a:cs typeface="+mn-cs"/>
+              </a:defRPr>
+            </a:lvl2pPr>
+            <a:lvl3pPr marL="914400" indent="0" algn="ctr" defTabSz="914400" rtl="0" eaLnBrk="1" latinLnBrk="0" hangingPunct="1">
+              <a:lnSpc>
+                <a:spcPct val="90000"/>
+              </a:lnSpc>
+              <a:spcBef>
+                <a:spcPts val="500"/>
+              </a:spcBef>
+              <a:buFont typeface="Arial" panose="020B0604020202020204" pitchFamily="34" charset="0"/>
+              <a:buNone/>
+              <a:defRPr sz="1800" kern="1200">
+                <a:solidFill>
+                  <a:schemeClr val="tx1"/>
+                </a:solidFill>
+                <a:latin typeface="+mn-lt"/>
+                <a:ea typeface="+mn-ea"/>
+                <a:cs typeface="+mn-cs"/>
+              </a:defRPr>
+            </a:lvl3pPr>
+            <a:lvl4pPr marL="1371600" indent="0" algn="ctr" defTabSz="914400" rtl="0" eaLnBrk="1" latinLnBrk="0" hangingPunct="1">
+              <a:lnSpc>
+                <a:spcPct val="90000"/>
+              </a:lnSpc>
+              <a:spcBef>
+                <a:spcPts val="500"/>
+              </a:spcBef>
+              <a:buFont typeface="Arial" panose="020B0604020202020204" pitchFamily="34" charset="0"/>
+              <a:buNone/>
+              <a:defRPr sz="1600" kern="1200">
+                <a:solidFill>
+                  <a:schemeClr val="tx1"/>
+                </a:solidFill>
+                <a:latin typeface="+mn-lt"/>
+                <a:ea typeface="+mn-ea"/>
+                <a:cs typeface="+mn-cs"/>
+              </a:defRPr>
+            </a:lvl4pPr>
+            <a:lvl5pPr marL="1828800" indent="0" algn="ctr" defTabSz="914400" rtl="0" eaLnBrk="1" latinLnBrk="0" hangingPunct="1">
+              <a:lnSpc>
+                <a:spcPct val="90000"/>
+              </a:lnSpc>
+              <a:spcBef>
+                <a:spcPts val="500"/>
+              </a:spcBef>
+              <a:buFont typeface="Arial" panose="020B0604020202020204" pitchFamily="34" charset="0"/>
+              <a:buNone/>
+              <a:defRPr sz="1600" kern="1200">
+                <a:solidFill>
+                  <a:schemeClr val="tx1"/>
+                </a:solidFill>
+                <a:latin typeface="+mn-lt"/>
+                <a:ea typeface="+mn-ea"/>
+                <a:cs typeface="+mn-cs"/>
+              </a:defRPr>
+            </a:lvl5pPr>
+            <a:lvl6pPr marL="2286000" indent="0" algn="ctr" defTabSz="914400" rtl="0" eaLnBrk="1" latinLnBrk="0" hangingPunct="1">
+              <a:lnSpc>
+                <a:spcPct val="90000"/>
+              </a:lnSpc>
+              <a:spcBef>
+                <a:spcPts val="500"/>
+              </a:spcBef>
+              <a:buFont typeface="Arial" panose="020B0604020202020204" pitchFamily="34" charset="0"/>
+              <a:buNone/>
+              <a:defRPr sz="1600" kern="1200">
+                <a:solidFill>
+                  <a:schemeClr val="tx1"/>
+                </a:solidFill>
+                <a:latin typeface="+mn-lt"/>
+                <a:ea typeface="+mn-ea"/>
+                <a:cs typeface="+mn-cs"/>
+              </a:defRPr>
+            </a:lvl6pPr>
+            <a:lvl7pPr marL="2743200" indent="0" algn="ctr" defTabSz="914400" rtl="0" eaLnBrk="1" latinLnBrk="0" hangingPunct="1">
+              <a:lnSpc>
+                <a:spcPct val="90000"/>
+              </a:lnSpc>
+              <a:spcBef>
+                <a:spcPts val="500"/>
+              </a:spcBef>
+              <a:buFont typeface="Arial" panose="020B0604020202020204" pitchFamily="34" charset="0"/>
+              <a:buNone/>
+              <a:defRPr sz="1600" kern="1200">
+                <a:solidFill>
+                  <a:schemeClr val="tx1"/>
+                </a:solidFill>
+                <a:latin typeface="+mn-lt"/>
+                <a:ea typeface="+mn-ea"/>
+                <a:cs typeface="+mn-cs"/>
+              </a:defRPr>
+            </a:lvl7pPr>
+            <a:lvl8pPr marL="3200400" indent="0" algn="ctr" defTabSz="914400" rtl="0" eaLnBrk="1" latinLnBrk="0" hangingPunct="1">
+              <a:lnSpc>
+                <a:spcPct val="90000"/>
+              </a:lnSpc>
+              <a:spcBef>
+                <a:spcPts val="500"/>
+              </a:spcBef>
+              <a:buFont typeface="Arial" panose="020B0604020202020204" pitchFamily="34" charset="0"/>
+              <a:buNone/>
+              <a:defRPr sz="1600" kern="1200">
+                <a:solidFill>
+                  <a:schemeClr val="tx1"/>
+                </a:solidFill>
+                <a:latin typeface="+mn-lt"/>
+                <a:ea typeface="+mn-ea"/>
+                <a:cs typeface="+mn-cs"/>
+              </a:defRPr>
+            </a:lvl8pPr>
+            <a:lvl9pPr marL="3657600" indent="0" algn="ctr" defTabSz="914400" rtl="0" eaLnBrk="1" latinLnBrk="0" hangingPunct="1">
+              <a:lnSpc>
+                <a:spcPct val="90000"/>
+              </a:lnSpc>
+              <a:spcBef>
+                <a:spcPts val="500"/>
+              </a:spcBef>
+              <a:buFont typeface="Arial" panose="020B0604020202020204" pitchFamily="34" charset="0"/>
+              <a:buNone/>
+              <a:defRPr sz="1600" kern="1200">
+                <a:solidFill>
+                  <a:schemeClr val="tx1"/>
+                </a:solidFill>
+                <a:latin typeface="+mn-lt"/>
+                <a:ea typeface="+mn-ea"/>
+                <a:cs typeface="+mn-cs"/>
+              </a:defRPr>
+            </a:lvl9pPr>
+          </a:lstStyle>
+          <a:p>
+            <a:pPr algn="l"/>
+            <a:r>
+              <a:rPr lang="en-US" sz="1600" dirty="0"/>
+              <a:t>Goal: Work with Databricks under source controls and fully automated deployments</a:t>
+            </a:r>
+          </a:p>
+        </p:txBody>
+      </p:sp>
+      <p:sp>
+        <p:nvSpPr>
+          <p:cNvPr id="17" name="TextBox 16">
+            <a:extLst>
+              <a:ext uri="{FF2B5EF4-FFF2-40B4-BE49-F238E27FC236}">
+                <a16:creationId xmlns:a16="http://schemas.microsoft.com/office/drawing/2014/main" id="{57D3E6D5-E43F-4376-8B5C-982E0F619D00}"/>
+              </a:ext>
+            </a:extLst>
+          </p:cNvPr>
+          <p:cNvSpPr txBox="1"/>
+          <p:nvPr/>
+        </p:nvSpPr>
+        <p:spPr>
+          <a:xfrm>
+            <a:off x="412028" y="1179578"/>
+            <a:ext cx="6844506" cy="5878532"/>
+          </a:xfrm>
+          <a:prstGeom prst="rect">
+            <a:avLst/>
+          </a:prstGeom>
+          <a:noFill/>
+        </p:spPr>
+        <p:txBody>
+          <a:bodyPr wrap="square" rtlCol="0">
+            <a:spAutoFit/>
+          </a:bodyPr>
+          <a:lstStyle/>
+          <a:p>
+            <a:r>
+              <a:rPr lang="en-US" sz="1400" dirty="0"/>
+              <a:t>Old Way</a:t>
+            </a:r>
+          </a:p>
+          <a:p>
+            <a:pPr marL="342900" indent="-342900">
+              <a:buFont typeface="Arial" panose="020B0604020202020204" pitchFamily="34" charset="0"/>
+              <a:buChar char="•"/>
+            </a:pPr>
+            <a:r>
+              <a:rPr lang="en-US" sz="1200" dirty="0"/>
+              <a:t>Save notebooks to Git /</a:t>
+            </a:r>
+            <a:r>
+              <a:rPr lang="en-US" sz="1200" dirty="0" err="1"/>
+              <a:t>MyProject</a:t>
+            </a:r>
+            <a:endParaRPr lang="en-US" sz="1200" dirty="0"/>
+          </a:p>
+          <a:p>
+            <a:endParaRPr lang="en-US" sz="1200" dirty="0"/>
+          </a:p>
+          <a:p>
+            <a:r>
+              <a:rPr lang="en-US" sz="1400" dirty="0"/>
+              <a:t>New Way</a:t>
+            </a:r>
+          </a:p>
+          <a:p>
+            <a:pPr marL="171450" indent="-171450">
+              <a:buFont typeface="Arial" panose="020B0604020202020204" pitchFamily="34" charset="0"/>
+              <a:buChar char="•"/>
+            </a:pPr>
+            <a:r>
+              <a:rPr lang="en-US" sz="1200" dirty="0" err="1"/>
+              <a:t>Ttt</a:t>
+            </a:r>
+            <a:endParaRPr lang="en-US" sz="1200" dirty="0"/>
+          </a:p>
+          <a:p>
+            <a:pPr marL="171450" indent="-171450">
+              <a:buFont typeface="Arial" panose="020B0604020202020204" pitchFamily="34" charset="0"/>
+              <a:buChar char="•"/>
+            </a:pPr>
+            <a:endParaRPr lang="en-US" sz="1200" dirty="0"/>
+          </a:p>
+          <a:p>
+            <a:pPr marL="171450" indent="-171450">
+              <a:buFont typeface="Arial" panose="020B0604020202020204" pitchFamily="34" charset="0"/>
+              <a:buChar char="•"/>
+            </a:pPr>
+            <a:endParaRPr lang="en-US" sz="1200" dirty="0"/>
+          </a:p>
+          <a:p>
+            <a:r>
+              <a:rPr lang="en-US" sz="1200" dirty="0"/>
+              <a:t>Steps</a:t>
+            </a:r>
+          </a:p>
+          <a:p>
+            <a:pPr marL="228600" indent="-228600">
+              <a:buFont typeface="+mj-lt"/>
+              <a:buAutoNum type="arabicPeriod"/>
+            </a:pPr>
+            <a:r>
+              <a:rPr lang="en-US" sz="1200" dirty="0"/>
+              <a:t>Parameter: Folder in Databricks?</a:t>
+            </a:r>
+          </a:p>
+          <a:p>
+            <a:pPr marL="228600" indent="-228600">
+              <a:buFont typeface="+mj-lt"/>
+              <a:buAutoNum type="arabicPeriod"/>
+            </a:pPr>
+            <a:r>
+              <a:rPr lang="en-US" sz="1200" dirty="0"/>
+              <a:t>Parameter: Where in source control? (assuming not recursive)</a:t>
+            </a:r>
+          </a:p>
+          <a:p>
+            <a:pPr marL="228600" indent="-228600">
+              <a:buFont typeface="+mj-lt"/>
+              <a:buAutoNum type="arabicPeriod"/>
+            </a:pPr>
+            <a:r>
+              <a:rPr lang="en-US" sz="1200" dirty="0"/>
+              <a:t>Create the folder in ADB</a:t>
+            </a:r>
+          </a:p>
+          <a:p>
+            <a:pPr marL="228600" indent="-228600">
+              <a:buFont typeface="+mj-lt"/>
+              <a:buAutoNum type="arabicPeriod"/>
+            </a:pPr>
+            <a:r>
+              <a:rPr lang="en-US" sz="1200" dirty="0"/>
+              <a:t>Deploy from source control to ADB folder</a:t>
+            </a:r>
+          </a:p>
+          <a:p>
+            <a:pPr marL="228600" indent="-228600">
+              <a:buFont typeface="+mj-lt"/>
+              <a:buAutoNum type="arabicPeriod"/>
+            </a:pPr>
+            <a:endParaRPr lang="en-US" sz="1200" dirty="0"/>
+          </a:p>
+          <a:p>
+            <a:pPr marL="228600" indent="-228600">
+              <a:buFont typeface="+mj-lt"/>
+              <a:buAutoNum type="arabicPeriod"/>
+            </a:pPr>
+            <a:endParaRPr lang="en-US" sz="1200" dirty="0"/>
+          </a:p>
+          <a:p>
+            <a:r>
+              <a:rPr lang="en-US" sz="1200" dirty="0"/>
+              <a:t>People</a:t>
+            </a:r>
+          </a:p>
+          <a:p>
+            <a:pPr marL="171450" indent="-171450">
+              <a:buFont typeface="Arial" panose="020B0604020202020204" pitchFamily="34" charset="0"/>
+              <a:buChar char="•"/>
+            </a:pPr>
+            <a:r>
+              <a:rPr lang="en-US" sz="1200" dirty="0"/>
+              <a:t>Work in their user's folder</a:t>
+            </a:r>
+          </a:p>
+          <a:p>
+            <a:pPr marL="171450" indent="-171450">
+              <a:buFont typeface="Arial" panose="020B0604020202020204" pitchFamily="34" charset="0"/>
+              <a:buChar char="•"/>
+            </a:pPr>
+            <a:r>
+              <a:rPr lang="en-US" sz="1200" dirty="0"/>
+              <a:t>Map to source control project “common folder”?</a:t>
+            </a:r>
+          </a:p>
+          <a:p>
+            <a:pPr marL="171450" indent="-171450">
+              <a:buFont typeface="Arial" panose="020B0604020202020204" pitchFamily="34" charset="0"/>
+              <a:buChar char="•"/>
+            </a:pPr>
+            <a:endParaRPr lang="en-US" sz="1200" dirty="0"/>
+          </a:p>
+          <a:p>
+            <a:pPr marL="171450" indent="-171450">
+              <a:buFont typeface="Arial" panose="020B0604020202020204" pitchFamily="34" charset="0"/>
+              <a:buChar char="•"/>
+            </a:pPr>
+            <a:endParaRPr lang="en-US" sz="1200" dirty="0"/>
+          </a:p>
+          <a:p>
+            <a:pPr marL="171450" indent="-171450">
+              <a:buFont typeface="Arial" panose="020B0604020202020204" pitchFamily="34" charset="0"/>
+              <a:buChar char="•"/>
+            </a:pPr>
+            <a:endParaRPr lang="en-US" sz="1200" dirty="0"/>
+          </a:p>
+          <a:p>
+            <a:r>
+              <a:rPr lang="en-US" sz="1200" dirty="0"/>
+              <a:t>Users folder</a:t>
+            </a:r>
+          </a:p>
+          <a:p>
+            <a:pPr marL="171450" indent="-171450">
+              <a:buFont typeface="Arial" panose="020B0604020202020204" pitchFamily="34" charset="0"/>
+              <a:buChar char="•"/>
+            </a:pPr>
+            <a:r>
+              <a:rPr lang="en-US" sz="1200" dirty="0"/>
+              <a:t>For testing code by users (mapped to source control under username/notebook-name</a:t>
+            </a:r>
+          </a:p>
+          <a:p>
+            <a:endParaRPr lang="en-US" sz="1200" dirty="0"/>
+          </a:p>
+          <a:p>
+            <a:r>
+              <a:rPr lang="en-US" sz="1200" dirty="0"/>
+              <a:t>Real code</a:t>
+            </a:r>
+          </a:p>
+          <a:p>
+            <a:pPr marL="171450" indent="-171450">
+              <a:buFont typeface="Arial" panose="020B0604020202020204" pitchFamily="34" charset="0"/>
+              <a:buChar char="•"/>
+            </a:pPr>
+            <a:r>
+              <a:rPr lang="en-US" sz="1200" dirty="0"/>
+              <a:t>Move your notebook (or clone) to a folder off the root (e.g. /MyProject-1/notebook-name)</a:t>
+            </a:r>
+          </a:p>
+          <a:p>
+            <a:pPr marL="171450" indent="-171450">
+              <a:buFont typeface="Arial" panose="020B0604020202020204" pitchFamily="34" charset="0"/>
+              <a:buChar char="•"/>
+            </a:pPr>
+            <a:r>
+              <a:rPr lang="en-US" sz="1200" dirty="0"/>
+              <a:t>Should we have many different projects or subfolders </a:t>
+            </a:r>
+          </a:p>
+          <a:p>
+            <a:pPr marL="171450" indent="-171450">
+              <a:buFont typeface="Arial" panose="020B0604020202020204" pitchFamily="34" charset="0"/>
+              <a:buChar char="•"/>
+            </a:pPr>
+            <a:r>
+              <a:rPr lang="en-US" sz="1200" dirty="0"/>
+              <a:t>Create folders????  Map to ADB</a:t>
+            </a:r>
+          </a:p>
+          <a:p>
+            <a:pPr marL="171450" indent="-171450">
+              <a:buFont typeface="Arial" panose="020B0604020202020204" pitchFamily="34" charset="0"/>
+              <a:buChar char="•"/>
+            </a:pPr>
+            <a:r>
+              <a:rPr lang="en-US" sz="1200" dirty="0"/>
+              <a:t>MOVE: Maintains Git</a:t>
+            </a:r>
+          </a:p>
+          <a:p>
+            <a:pPr marL="171450" indent="-171450">
+              <a:buFont typeface="Arial" panose="020B0604020202020204" pitchFamily="34" charset="0"/>
+              <a:buChar char="•"/>
+            </a:pPr>
+            <a:r>
+              <a:rPr lang="en-US" sz="1200" dirty="0"/>
+              <a:t>CLONE: Relink (relink to Git u could put in proper path)</a:t>
+            </a:r>
+          </a:p>
+          <a:p>
+            <a:pPr marL="171450" indent="-171450">
+              <a:buFont typeface="Arial" panose="020B0604020202020204" pitchFamily="34" charset="0"/>
+              <a:buChar char="•"/>
+            </a:pPr>
+            <a:endParaRPr lang="en-US" sz="1200" dirty="0"/>
+          </a:p>
+          <a:p>
+            <a:pPr marL="171450" indent="-171450">
+              <a:buFont typeface="Arial" panose="020B0604020202020204" pitchFamily="34" charset="0"/>
+              <a:buChar char="•"/>
+            </a:pPr>
+            <a:endParaRPr lang="en-US" sz="1200" dirty="0"/>
+          </a:p>
+        </p:txBody>
+      </p:sp>
+      <p:sp>
+        <p:nvSpPr>
+          <p:cNvPr id="3" name="TextBox 2">
+            <a:extLst>
+              <a:ext uri="{FF2B5EF4-FFF2-40B4-BE49-F238E27FC236}">
+                <a16:creationId xmlns:a16="http://schemas.microsoft.com/office/drawing/2014/main" id="{7E78C5CA-FDD7-4A89-820B-0618A956CF63}"/>
+              </a:ext>
+            </a:extLst>
+          </p:cNvPr>
+          <p:cNvSpPr txBox="1"/>
+          <p:nvPr/>
+        </p:nvSpPr>
+        <p:spPr>
+          <a:xfrm>
+            <a:off x="7814512" y="1732547"/>
+            <a:ext cx="3573378" cy="1754326"/>
+          </a:xfrm>
+          <a:prstGeom prst="rect">
+            <a:avLst/>
+          </a:prstGeom>
+          <a:noFill/>
+        </p:spPr>
+        <p:txBody>
+          <a:bodyPr wrap="square" rtlCol="0">
+            <a:spAutoFit/>
+          </a:bodyPr>
+          <a:lstStyle/>
+          <a:p>
+            <a:r>
+              <a:rPr lang="en-US" dirty="0"/>
+              <a:t>One folder for all your notebooks and subfolders.  Deploy the top </a:t>
+            </a:r>
+            <a:r>
+              <a:rPr lang="en-US" dirty="0" err="1"/>
+              <a:t>leve</a:t>
+            </a:r>
+            <a:r>
+              <a:rPr lang="en-US" dirty="0"/>
+              <a:t> and that would deploy the rest.</a:t>
+            </a:r>
+          </a:p>
+          <a:p>
+            <a:endParaRPr lang="en-US" dirty="0"/>
+          </a:p>
+          <a:p>
+            <a:r>
+              <a:rPr lang="en-US" dirty="0"/>
+              <a:t>IF you want many top level folder u edit the </a:t>
+            </a:r>
+            <a:r>
+              <a:rPr lang="en-US" dirty="0" err="1"/>
+              <a:t>pipeline.yml</a:t>
+            </a:r>
+            <a:endParaRPr lang="en-US" dirty="0"/>
+          </a:p>
+        </p:txBody>
+      </p:sp>
+    </p:spTree>
+    <p:extLst>
+      <p:ext uri="{BB962C8B-B14F-4D97-AF65-F5344CB8AC3E}">
+        <p14:creationId xmlns:p14="http://schemas.microsoft.com/office/powerpoint/2010/main" val="1659332599"/>
+      </p:ext>
+    </p:extLst>
+  </p:cSld>
+  <p:clrMapOvr>
+    <a:masterClrMapping/>
+  </p:clrMapOvr>
+</p:sld>
+</file>
+
+<file path=ppt/slides/slide4.xml><?xml version="1.0" encoding="utf-8"?>
+<p:sld xmlns:a="http://schemas.openxmlformats.org/drawingml/2006/main" xmlns:r="http://schemas.openxmlformats.org/officeDocument/2006/relationships" xmlns:p="http://schemas.openxmlformats.org/presentationml/2006/main">
+  <p:cSld>
+    <p:spTree>
+      <p:nvGrpSpPr>
+        <p:cNvPr id="1" name=""/>
+        <p:cNvGrpSpPr/>
+        <p:nvPr/>
+      </p:nvGrpSpPr>
+      <p:grpSpPr>
+        <a:xfrm>
+          <a:off x="0" y="0"/>
+          <a:ext cx="0" cy="0"/>
+          <a:chOff x="0" y="0"/>
+          <a:chExt cx="0" cy="0"/>
+        </a:xfrm>
+      </p:grpSpPr>
+      <p:sp>
+        <p:nvSpPr>
+          <p:cNvPr id="33" name="Title 1">
+            <a:extLst>
+              <a:ext uri="{FF2B5EF4-FFF2-40B4-BE49-F238E27FC236}">
+                <a16:creationId xmlns:a16="http://schemas.microsoft.com/office/drawing/2014/main" id="{E5AA6774-BAB0-435D-B549-E23323D367BB}"/>
+              </a:ext>
+            </a:extLst>
+          </p:cNvPr>
+          <p:cNvSpPr>
+            <a:spLocks noGrp="1"/>
+          </p:cNvSpPr>
+          <p:nvPr>
+            <p:ph type="ctrTitle"/>
+          </p:nvPr>
+        </p:nvSpPr>
+        <p:spPr>
+          <a:xfrm>
+            <a:off x="189471" y="125584"/>
+            <a:ext cx="9144000" cy="549918"/>
+          </a:xfrm>
+        </p:spPr>
+        <p:txBody>
+          <a:bodyPr>
+            <a:noAutofit/>
+          </a:bodyPr>
+          <a:lstStyle/>
+          <a:p>
+            <a:pPr algn="l"/>
+            <a:r>
+              <a:rPr lang="en-US" sz="2800" dirty="0"/>
+              <a:t>Databricks Dev Ops</a:t>
+            </a:r>
+          </a:p>
+        </p:txBody>
+      </p:sp>
+      <p:sp>
+        <p:nvSpPr>
+          <p:cNvPr id="35" name="Subtitle 2">
+            <a:extLst>
+              <a:ext uri="{FF2B5EF4-FFF2-40B4-BE49-F238E27FC236}">
+                <a16:creationId xmlns:a16="http://schemas.microsoft.com/office/drawing/2014/main" id="{C5F6A37E-104C-4A01-BF62-36779E32047C}"/>
+              </a:ext>
+            </a:extLst>
+          </p:cNvPr>
+          <p:cNvSpPr txBox="1">
+            <a:spLocks/>
+          </p:cNvSpPr>
+          <p:nvPr/>
+        </p:nvSpPr>
+        <p:spPr>
+          <a:xfrm>
+            <a:off x="296130" y="570261"/>
+            <a:ext cx="11211698" cy="331529"/>
+          </a:xfrm>
+          <a:prstGeom prst="rect">
+            <a:avLst/>
+          </a:prstGeom>
+        </p:spPr>
+        <p:txBody>
+          <a:bodyPr vert="horz" lIns="91440" tIns="45720" rIns="91440" bIns="45720" rtlCol="0">
+            <a:normAutofit/>
+          </a:bodyPr>
+          <a:lstStyle>
+            <a:lvl1pPr marL="0" indent="0" algn="ctr" defTabSz="914400" rtl="0" eaLnBrk="1" latinLnBrk="0" hangingPunct="1">
+              <a:lnSpc>
+                <a:spcPct val="90000"/>
+              </a:lnSpc>
+              <a:spcBef>
+                <a:spcPts val="1000"/>
+              </a:spcBef>
+              <a:buFont typeface="Arial" panose="020B0604020202020204" pitchFamily="34" charset="0"/>
+              <a:buNone/>
+              <a:defRPr sz="2400" kern="1200">
+                <a:solidFill>
+                  <a:schemeClr val="tx1"/>
+                </a:solidFill>
+                <a:latin typeface="+mn-lt"/>
+                <a:ea typeface="+mn-ea"/>
+                <a:cs typeface="+mn-cs"/>
+              </a:defRPr>
+            </a:lvl1pPr>
+            <a:lvl2pPr marL="457200" indent="0" algn="ctr" defTabSz="914400" rtl="0" eaLnBrk="1" latinLnBrk="0" hangingPunct="1">
+              <a:lnSpc>
+                <a:spcPct val="90000"/>
+              </a:lnSpc>
+              <a:spcBef>
+                <a:spcPts val="500"/>
+              </a:spcBef>
+              <a:buFont typeface="Arial" panose="020B0604020202020204" pitchFamily="34" charset="0"/>
+              <a:buNone/>
+              <a:defRPr sz="2000" kern="1200">
+                <a:solidFill>
+                  <a:schemeClr val="tx1"/>
+                </a:solidFill>
+                <a:latin typeface="+mn-lt"/>
+                <a:ea typeface="+mn-ea"/>
+                <a:cs typeface="+mn-cs"/>
+              </a:defRPr>
+            </a:lvl2pPr>
+            <a:lvl3pPr marL="914400" indent="0" algn="ctr" defTabSz="914400" rtl="0" eaLnBrk="1" latinLnBrk="0" hangingPunct="1">
+              <a:lnSpc>
+                <a:spcPct val="90000"/>
+              </a:lnSpc>
+              <a:spcBef>
+                <a:spcPts val="500"/>
+              </a:spcBef>
+              <a:buFont typeface="Arial" panose="020B0604020202020204" pitchFamily="34" charset="0"/>
+              <a:buNone/>
+              <a:defRPr sz="1800" kern="1200">
+                <a:solidFill>
+                  <a:schemeClr val="tx1"/>
+                </a:solidFill>
+                <a:latin typeface="+mn-lt"/>
+                <a:ea typeface="+mn-ea"/>
+                <a:cs typeface="+mn-cs"/>
+              </a:defRPr>
+            </a:lvl3pPr>
+            <a:lvl4pPr marL="1371600" indent="0" algn="ctr" defTabSz="914400" rtl="0" eaLnBrk="1" latinLnBrk="0" hangingPunct="1">
+              <a:lnSpc>
+                <a:spcPct val="90000"/>
+              </a:lnSpc>
+              <a:spcBef>
+                <a:spcPts val="500"/>
+              </a:spcBef>
+              <a:buFont typeface="Arial" panose="020B0604020202020204" pitchFamily="34" charset="0"/>
+              <a:buNone/>
+              <a:defRPr sz="1600" kern="1200">
+                <a:solidFill>
+                  <a:schemeClr val="tx1"/>
+                </a:solidFill>
+                <a:latin typeface="+mn-lt"/>
+                <a:ea typeface="+mn-ea"/>
+                <a:cs typeface="+mn-cs"/>
+              </a:defRPr>
+            </a:lvl4pPr>
+            <a:lvl5pPr marL="1828800" indent="0" algn="ctr" defTabSz="914400" rtl="0" eaLnBrk="1" latinLnBrk="0" hangingPunct="1">
+              <a:lnSpc>
+                <a:spcPct val="90000"/>
+              </a:lnSpc>
+              <a:spcBef>
+                <a:spcPts val="500"/>
+              </a:spcBef>
+              <a:buFont typeface="Arial" panose="020B0604020202020204" pitchFamily="34" charset="0"/>
+              <a:buNone/>
+              <a:defRPr sz="1600" kern="1200">
+                <a:solidFill>
+                  <a:schemeClr val="tx1"/>
+                </a:solidFill>
+                <a:latin typeface="+mn-lt"/>
+                <a:ea typeface="+mn-ea"/>
+                <a:cs typeface="+mn-cs"/>
+              </a:defRPr>
+            </a:lvl5pPr>
+            <a:lvl6pPr marL="2286000" indent="0" algn="ctr" defTabSz="914400" rtl="0" eaLnBrk="1" latinLnBrk="0" hangingPunct="1">
+              <a:lnSpc>
+                <a:spcPct val="90000"/>
+              </a:lnSpc>
+              <a:spcBef>
+                <a:spcPts val="500"/>
+              </a:spcBef>
+              <a:buFont typeface="Arial" panose="020B0604020202020204" pitchFamily="34" charset="0"/>
+              <a:buNone/>
+              <a:defRPr sz="1600" kern="1200">
+                <a:solidFill>
+                  <a:schemeClr val="tx1"/>
+                </a:solidFill>
+                <a:latin typeface="+mn-lt"/>
+                <a:ea typeface="+mn-ea"/>
+                <a:cs typeface="+mn-cs"/>
+              </a:defRPr>
+            </a:lvl6pPr>
+            <a:lvl7pPr marL="2743200" indent="0" algn="ctr" defTabSz="914400" rtl="0" eaLnBrk="1" latinLnBrk="0" hangingPunct="1">
+              <a:lnSpc>
+                <a:spcPct val="90000"/>
+              </a:lnSpc>
+              <a:spcBef>
+                <a:spcPts val="500"/>
+              </a:spcBef>
+              <a:buFont typeface="Arial" panose="020B0604020202020204" pitchFamily="34" charset="0"/>
+              <a:buNone/>
+              <a:defRPr sz="1600" kern="1200">
+                <a:solidFill>
+                  <a:schemeClr val="tx1"/>
+                </a:solidFill>
+                <a:latin typeface="+mn-lt"/>
+                <a:ea typeface="+mn-ea"/>
+                <a:cs typeface="+mn-cs"/>
+              </a:defRPr>
+            </a:lvl7pPr>
+            <a:lvl8pPr marL="3200400" indent="0" algn="ctr" defTabSz="914400" rtl="0" eaLnBrk="1" latinLnBrk="0" hangingPunct="1">
+              <a:lnSpc>
+                <a:spcPct val="90000"/>
+              </a:lnSpc>
+              <a:spcBef>
+                <a:spcPts val="500"/>
+              </a:spcBef>
+              <a:buFont typeface="Arial" panose="020B0604020202020204" pitchFamily="34" charset="0"/>
+              <a:buNone/>
+              <a:defRPr sz="1600" kern="1200">
+                <a:solidFill>
+                  <a:schemeClr val="tx1"/>
+                </a:solidFill>
+                <a:latin typeface="+mn-lt"/>
+                <a:ea typeface="+mn-ea"/>
+                <a:cs typeface="+mn-cs"/>
+              </a:defRPr>
+            </a:lvl8pPr>
+            <a:lvl9pPr marL="3657600" indent="0" algn="ctr" defTabSz="914400" rtl="0" eaLnBrk="1" latinLnBrk="0" hangingPunct="1">
+              <a:lnSpc>
+                <a:spcPct val="90000"/>
+              </a:lnSpc>
+              <a:spcBef>
+                <a:spcPts val="500"/>
+              </a:spcBef>
+              <a:buFont typeface="Arial" panose="020B0604020202020204" pitchFamily="34" charset="0"/>
+              <a:buNone/>
+              <a:defRPr sz="1600" kern="1200">
+                <a:solidFill>
+                  <a:schemeClr val="tx1"/>
+                </a:solidFill>
+                <a:latin typeface="+mn-lt"/>
+                <a:ea typeface="+mn-ea"/>
+                <a:cs typeface="+mn-cs"/>
+              </a:defRPr>
+            </a:lvl9pPr>
+          </a:lstStyle>
+          <a:p>
+            <a:pPr algn="l"/>
+            <a:r>
+              <a:rPr lang="en-US" sz="1600" dirty="0"/>
+              <a:t>Goal: Work with Databricks under source controls and fully automated deployments</a:t>
+            </a:r>
+          </a:p>
+        </p:txBody>
+      </p:sp>
+      <p:sp>
+        <p:nvSpPr>
+          <p:cNvPr id="17" name="TextBox 16">
+            <a:extLst>
+              <a:ext uri="{FF2B5EF4-FFF2-40B4-BE49-F238E27FC236}">
+                <a16:creationId xmlns:a16="http://schemas.microsoft.com/office/drawing/2014/main" id="{57D3E6D5-E43F-4376-8B5C-982E0F619D00}"/>
+              </a:ext>
+            </a:extLst>
+          </p:cNvPr>
+          <p:cNvSpPr txBox="1"/>
+          <p:nvPr/>
+        </p:nvSpPr>
+        <p:spPr>
+          <a:xfrm>
+            <a:off x="412028" y="1179578"/>
+            <a:ext cx="6844506" cy="3200876"/>
+          </a:xfrm>
+          <a:prstGeom prst="rect">
+            <a:avLst/>
+          </a:prstGeom>
+          <a:noFill/>
+        </p:spPr>
+        <p:txBody>
+          <a:bodyPr wrap="square" rtlCol="0">
+            <a:spAutoFit/>
+          </a:bodyPr>
+          <a:lstStyle/>
+          <a:p>
+            <a:r>
+              <a:rPr lang="en-US" sz="1400" dirty="0"/>
+              <a:t>Clusters</a:t>
+            </a:r>
+          </a:p>
+          <a:p>
+            <a:r>
+              <a:rPr lang="en-US" sz="1400" dirty="0"/>
+              <a:t>-	Makes mess in your work area</a:t>
+            </a:r>
+          </a:p>
+          <a:p>
+            <a:pPr marL="171450" indent="-171450">
+              <a:buFontTx/>
+              <a:buChar char="-"/>
+            </a:pPr>
+            <a:r>
+              <a:rPr lang="en-US" sz="1400" dirty="0"/>
+              <a:t>Copy json to source control</a:t>
+            </a:r>
+          </a:p>
+          <a:p>
+            <a:pPr marL="171450" indent="-171450">
+              <a:buFontTx/>
+              <a:buChar char="-"/>
+            </a:pPr>
+            <a:endParaRPr lang="en-US" sz="1400" dirty="0"/>
+          </a:p>
+          <a:p>
+            <a:pPr marL="171450" indent="-171450">
+              <a:buFontTx/>
+              <a:buChar char="-"/>
+            </a:pPr>
+            <a:r>
+              <a:rPr lang="en-US" sz="1200" dirty="0"/>
+              <a:t>JOBS</a:t>
+            </a:r>
+          </a:p>
+          <a:p>
+            <a:pPr marL="171450" indent="-171450">
+              <a:buFontTx/>
+              <a:buChar char="-"/>
+            </a:pPr>
+            <a:r>
+              <a:rPr lang="en-US" sz="1200" dirty="0"/>
+              <a:t>- list </a:t>
+            </a:r>
+            <a:r>
+              <a:rPr lang="en-US" sz="1200" dirty="0" err="1"/>
+              <a:t>og</a:t>
+            </a:r>
+            <a:r>
+              <a:rPr lang="en-US" sz="1200" dirty="0"/>
+              <a:t> jobs to copy from work area to DEV?????</a:t>
+            </a:r>
+          </a:p>
+          <a:p>
+            <a:pPr marL="171450" indent="-171450">
+              <a:buFontTx/>
+              <a:buChar char="-"/>
+            </a:pPr>
+            <a:r>
+              <a:rPr lang="en-US" sz="1200" dirty="0"/>
+              <a:t>Or use ADF? With source control!</a:t>
+            </a:r>
+          </a:p>
+          <a:p>
+            <a:pPr marL="171450" indent="-171450">
+              <a:buFontTx/>
+              <a:buChar char="-"/>
+            </a:pPr>
+            <a:r>
+              <a:rPr lang="en-US" sz="1200" dirty="0"/>
+              <a:t>BEST PRACTICE!</a:t>
+            </a:r>
+          </a:p>
+          <a:p>
+            <a:pPr marL="171450" indent="-171450">
+              <a:buFontTx/>
+              <a:buChar char="-"/>
+            </a:pPr>
+            <a:endParaRPr lang="en-US" sz="1200" dirty="0"/>
+          </a:p>
+          <a:p>
+            <a:pPr marL="171450" indent="-171450">
+              <a:buFontTx/>
+              <a:buChar char="-"/>
+            </a:pPr>
+            <a:endParaRPr lang="en-US" sz="1200" dirty="0"/>
+          </a:p>
+          <a:p>
+            <a:r>
+              <a:rPr lang="en-US" sz="1200" dirty="0"/>
+              <a:t>HIVE!!!!</a:t>
+            </a:r>
+          </a:p>
+          <a:p>
+            <a:r>
+              <a:rPr lang="en-US" sz="1200" dirty="0"/>
+              <a:t>Scripts management!</a:t>
+            </a:r>
+          </a:p>
+          <a:p>
+            <a:endParaRPr lang="en-US" sz="1200" dirty="0"/>
+          </a:p>
+          <a:p>
+            <a:r>
+              <a:rPr lang="en-US" sz="1200" dirty="0"/>
+              <a:t>MOUNT POINTS</a:t>
+            </a:r>
+          </a:p>
+          <a:p>
+            <a:endParaRPr lang="en-US" sz="1200" dirty="0"/>
+          </a:p>
+          <a:p>
+            <a:endParaRPr lang="en-US" sz="1400" dirty="0"/>
+          </a:p>
+        </p:txBody>
+      </p:sp>
+    </p:spTree>
+    <p:extLst>
+      <p:ext uri="{BB962C8B-B14F-4D97-AF65-F5344CB8AC3E}">
+        <p14:creationId xmlns:p14="http://schemas.microsoft.com/office/powerpoint/2010/main" val="1961647739"/>
+      </p:ext>
+    </p:extLst>
+  </p:cSld>
+  <p:clrMapOvr>
+    <a:masterClrMapping/>
+  </p:clrMapOvr>
+</p:sld>
+</file>
+
 <file path=ppt/theme/theme1.xml><?xml version="1.0" encoding="utf-8"?>
 <a:theme xmlns:a="http://schemas.openxmlformats.org/drawingml/2006/main" name="Office Theme">
   <a:themeElements>
@@ -8156,25 +9778,6 @@
 </file>
 
 <file path=customXml/item1.xml><?xml version="1.0" encoding="utf-8"?>
-<?mso-contentType ?>
-<FormTemplates xmlns="http://schemas.microsoft.com/sharepoint/v3/contenttype/forms">
-  <Display>DocumentLibraryForm</Display>
-  <Edit>DocumentLibraryForm</Edit>
-  <New>DocumentLibraryForm</New>
-</FormTemplates>
-</file>
-
-<file path=customXml/item2.xml><?xml version="1.0" encoding="utf-8"?>
-<p:properties xmlns:p="http://schemas.microsoft.com/office/2006/metadata/properties" xmlns:xsi="http://www.w3.org/2001/XMLSchema-instance" xmlns:pc="http://schemas.microsoft.com/office/infopath/2007/PartnerControls">
-  <documentManagement>
-    <_ip_UnifiedCompliancePolicyUIAction xmlns="http://schemas.microsoft.com/sharepoint/v3" xsi:nil="true"/>
-    <_STS_x0020_Hashtags xmlns="912cb619-99d2-4794-acea-8354d3da3f58"/>
-    <_ip_UnifiedCompliancePolicyProperties xmlns="http://schemas.microsoft.com/sharepoint/v3" xsi:nil="true"/>
-  </documentManagement>
-</p:properties>
-</file>
-
-<file path=customXml/item3.xml><?xml version="1.0" encoding="utf-8"?>
 <ct:contentTypeSchema xmlns:ct="http://schemas.microsoft.com/office/2006/metadata/contentType" xmlns:ma="http://schemas.microsoft.com/office/2006/metadata/properties/metaAttributes" ct:_="" ma:_="" ma:contentTypeName="Document" ma:contentTypeID="0x010100E91BF5703B036B41A0430F443AD95DB8" ma:contentTypeVersion="19" ma:contentTypeDescription="Create a new document." ma:contentTypeScope="" ma:versionID="ffaa6361bbca0f44b1c0ce4466c0db6d">
   <xsd:schema xmlns:xsd="http://www.w3.org/2001/XMLSchema" xmlns:xs="http://www.w3.org/2001/XMLSchema" xmlns:p="http://schemas.microsoft.com/office/2006/metadata/properties" xmlns:ns1="http://schemas.microsoft.com/sharepoint/v3" xmlns:ns3="d02dc944-d877-4fdc-84c6-4fb412a3c730" xmlns:ns4="912cb619-99d2-4794-acea-8354d3da3f58" targetNamespace="http://schemas.microsoft.com/office/2006/metadata/properties" ma:root="true" ma:fieldsID="b40e0413ab5e745cbe4ceab969b882de" ns1:_="" ns3:_="" ns4:_="">
     <xsd:import namespace="http://schemas.microsoft.com/sharepoint/v3"/>
@@ -8448,10 +10051,41 @@
 </ct:contentTypeSchema>
 </file>
 
+<file path=customXml/item2.xml><?xml version="1.0" encoding="utf-8"?>
+<p:properties xmlns:p="http://schemas.microsoft.com/office/2006/metadata/properties" xmlns:xsi="http://www.w3.org/2001/XMLSchema-instance" xmlns:pc="http://schemas.microsoft.com/office/infopath/2007/PartnerControls">
+  <documentManagement>
+    <_ip_UnifiedCompliancePolicyUIAction xmlns="http://schemas.microsoft.com/sharepoint/v3" xsi:nil="true"/>
+    <_STS_x0020_Hashtags xmlns="912cb619-99d2-4794-acea-8354d3da3f58"/>
+    <_ip_UnifiedCompliancePolicyProperties xmlns="http://schemas.microsoft.com/sharepoint/v3" xsi:nil="true"/>
+  </documentManagement>
+</p:properties>
+</file>
+
+<file path=customXml/item3.xml><?xml version="1.0" encoding="utf-8"?>
+<?mso-contentType ?>
+<FormTemplates xmlns="http://schemas.microsoft.com/sharepoint/v3/contenttype/forms">
+  <Display>DocumentLibraryForm</Display>
+  <Edit>DocumentLibraryForm</Edit>
+  <New>DocumentLibraryForm</New>
+</FormTemplates>
+</file>
+
 <file path=customXml/itemProps1.xml><?xml version="1.0" encoding="utf-8"?>
-<ds:datastoreItem xmlns:ds="http://schemas.openxmlformats.org/officeDocument/2006/customXml" ds:itemID="{116A9811-A868-4FA1-96A7-0C195F67FCFD}">
+<ds:datastoreItem xmlns:ds="http://schemas.openxmlformats.org/officeDocument/2006/customXml" ds:itemID="{F1D7A875-EC20-4E52-AF72-101135F1265B}">
   <ds:schemaRefs>
-    <ds:schemaRef ds:uri="http://schemas.microsoft.com/sharepoint/v3/contenttype/forms"/>
+    <ds:schemaRef ds:uri="http://schemas.microsoft.com/office/2006/metadata/contentType"/>
+    <ds:schemaRef ds:uri="http://schemas.microsoft.com/office/2006/metadata/properties/metaAttributes"/>
+    <ds:schemaRef ds:uri="http://www.w3.org/2001/XMLSchema"/>
+    <ds:schemaRef ds:uri="http://schemas.microsoft.com/office/2006/metadata/properties"/>
+    <ds:schemaRef ds:uri="http://schemas.microsoft.com/sharepoint/v3"/>
+    <ds:schemaRef ds:uri="d02dc944-d877-4fdc-84c6-4fb412a3c730"/>
+    <ds:schemaRef ds:uri="912cb619-99d2-4794-acea-8354d3da3f58"/>
+    <ds:schemaRef ds:uri="http://schemas.microsoft.com/office/2006/documentManagement/types"/>
+    <ds:schemaRef ds:uri="http://schemas.microsoft.com/office/infopath/2007/PartnerControls"/>
+    <ds:schemaRef ds:uri="http://schemas.openxmlformats.org/package/2006/metadata/core-properties"/>
+    <ds:schemaRef ds:uri="http://purl.org/dc/elements/1.1/"/>
+    <ds:schemaRef ds:uri="http://purl.org/dc/terms/"/>
+    <ds:schemaRef ds:uri="http://schemas.microsoft.com/internal/obd"/>
   </ds:schemaRefs>
 </ds:datastoreItem>
 </file>
@@ -8475,21 +10109,9 @@
 </file>
 
 <file path=customXml/itemProps3.xml><?xml version="1.0" encoding="utf-8"?>
-<ds:datastoreItem xmlns:ds="http://schemas.openxmlformats.org/officeDocument/2006/customXml" ds:itemID="{F1D7A875-EC20-4E52-AF72-101135F1265B}">
+<ds:datastoreItem xmlns:ds="http://schemas.openxmlformats.org/officeDocument/2006/customXml" ds:itemID="{116A9811-A868-4FA1-96A7-0C195F67FCFD}">
   <ds:schemaRefs>
-    <ds:schemaRef ds:uri="http://schemas.microsoft.com/office/2006/metadata/contentType"/>
-    <ds:schemaRef ds:uri="http://schemas.microsoft.com/office/2006/metadata/properties/metaAttributes"/>
-    <ds:schemaRef ds:uri="http://www.w3.org/2001/XMLSchema"/>
-    <ds:schemaRef ds:uri="http://schemas.microsoft.com/office/2006/metadata/properties"/>
-    <ds:schemaRef ds:uri="http://schemas.microsoft.com/sharepoint/v3"/>
-    <ds:schemaRef ds:uri="d02dc944-d877-4fdc-84c6-4fb412a3c730"/>
-    <ds:schemaRef ds:uri="912cb619-99d2-4794-acea-8354d3da3f58"/>
-    <ds:schemaRef ds:uri="http://schemas.microsoft.com/office/2006/documentManagement/types"/>
-    <ds:schemaRef ds:uri="http://schemas.microsoft.com/office/infopath/2007/PartnerControls"/>
-    <ds:schemaRef ds:uri="http://schemas.openxmlformats.org/package/2006/metadata/core-properties"/>
-    <ds:schemaRef ds:uri="http://purl.org/dc/elements/1.1/"/>
-    <ds:schemaRef ds:uri="http://purl.org/dc/terms/"/>
-    <ds:schemaRef ds:uri="http://schemas.microsoft.com/internal/obd"/>
+    <ds:schemaRef ds:uri="http://schemas.microsoft.com/sharepoint/v3/contenttype/forms"/>
   </ds:schemaRefs>
 </ds:datastoreItem>
 </file>
</xml_diff>

<commit_message>
Updates to pipeline for Mode
</commit_message>
<xml_diff>
--- a/Databricks Dev Ops.pptx
+++ b/Databricks Dev Ops.pptx
@@ -2660,7 +2660,7 @@
           <a:p>
             <a:fld id="{D7A2CEBF-19A8-45A4-87F4-7E255B5A8DA3}" type="datetimeFigureOut">
               <a:rPr lang="en-US" smtClean="0"/>
-              <a:t>7/24/2020</a:t>
+              <a:t>7/27/2020</a:t>
             </a:fld>
             <a:endParaRPr lang="en-US" dirty="0"/>
           </a:p>
@@ -2858,7 +2858,7 @@
           <a:p>
             <a:fld id="{D7A2CEBF-19A8-45A4-87F4-7E255B5A8DA3}" type="datetimeFigureOut">
               <a:rPr lang="en-US" smtClean="0"/>
-              <a:t>7/24/2020</a:t>
+              <a:t>7/27/2020</a:t>
             </a:fld>
             <a:endParaRPr lang="en-US" dirty="0"/>
           </a:p>
@@ -3066,7 +3066,7 @@
           <a:p>
             <a:fld id="{D7A2CEBF-19A8-45A4-87F4-7E255B5A8DA3}" type="datetimeFigureOut">
               <a:rPr lang="en-US" smtClean="0"/>
-              <a:t>7/24/2020</a:t>
+              <a:t>7/27/2020</a:t>
             </a:fld>
             <a:endParaRPr lang="en-US" dirty="0"/>
           </a:p>
@@ -3264,7 +3264,7 @@
           <a:p>
             <a:fld id="{D7A2CEBF-19A8-45A4-87F4-7E255B5A8DA3}" type="datetimeFigureOut">
               <a:rPr lang="en-US" smtClean="0"/>
-              <a:t>7/24/2020</a:t>
+              <a:t>7/27/2020</a:t>
             </a:fld>
             <a:endParaRPr lang="en-US" dirty="0"/>
           </a:p>
@@ -3539,7 +3539,7 @@
           <a:p>
             <a:fld id="{D7A2CEBF-19A8-45A4-87F4-7E255B5A8DA3}" type="datetimeFigureOut">
               <a:rPr lang="en-US" smtClean="0"/>
-              <a:t>7/24/2020</a:t>
+              <a:t>7/27/2020</a:t>
             </a:fld>
             <a:endParaRPr lang="en-US" dirty="0"/>
           </a:p>
@@ -3804,7 +3804,7 @@
           <a:p>
             <a:fld id="{D7A2CEBF-19A8-45A4-87F4-7E255B5A8DA3}" type="datetimeFigureOut">
               <a:rPr lang="en-US" smtClean="0"/>
-              <a:t>7/24/2020</a:t>
+              <a:t>7/27/2020</a:t>
             </a:fld>
             <a:endParaRPr lang="en-US" dirty="0"/>
           </a:p>
@@ -4216,7 +4216,7 @@
           <a:p>
             <a:fld id="{D7A2CEBF-19A8-45A4-87F4-7E255B5A8DA3}" type="datetimeFigureOut">
               <a:rPr lang="en-US" smtClean="0"/>
-              <a:t>7/24/2020</a:t>
+              <a:t>7/27/2020</a:t>
             </a:fld>
             <a:endParaRPr lang="en-US" dirty="0"/>
           </a:p>
@@ -4357,7 +4357,7 @@
           <a:p>
             <a:fld id="{D7A2CEBF-19A8-45A4-87F4-7E255B5A8DA3}" type="datetimeFigureOut">
               <a:rPr lang="en-US" smtClean="0"/>
-              <a:t>7/24/2020</a:t>
+              <a:t>7/27/2020</a:t>
             </a:fld>
             <a:endParaRPr lang="en-US" dirty="0"/>
           </a:p>
@@ -4470,7 +4470,7 @@
           <a:p>
             <a:fld id="{D7A2CEBF-19A8-45A4-87F4-7E255B5A8DA3}" type="datetimeFigureOut">
               <a:rPr lang="en-US" smtClean="0"/>
-              <a:t>7/24/2020</a:t>
+              <a:t>7/27/2020</a:t>
             </a:fld>
             <a:endParaRPr lang="en-US" dirty="0"/>
           </a:p>
@@ -4781,7 +4781,7 @@
           <a:p>
             <a:fld id="{D7A2CEBF-19A8-45A4-87F4-7E255B5A8DA3}" type="datetimeFigureOut">
               <a:rPr lang="en-US" smtClean="0"/>
-              <a:t>7/24/2020</a:t>
+              <a:t>7/27/2020</a:t>
             </a:fld>
             <a:endParaRPr lang="en-US" dirty="0"/>
           </a:p>
@@ -5069,7 +5069,7 @@
           <a:p>
             <a:fld id="{D7A2CEBF-19A8-45A4-87F4-7E255B5A8DA3}" type="datetimeFigureOut">
               <a:rPr lang="en-US" smtClean="0"/>
-              <a:t>7/24/2020</a:t>
+              <a:t>7/27/2020</a:t>
             </a:fld>
             <a:endParaRPr lang="en-US" dirty="0"/>
           </a:p>
@@ -5310,7 +5310,7 @@
           <a:p>
             <a:fld id="{D7A2CEBF-19A8-45A4-87F4-7E255B5A8DA3}" type="datetimeFigureOut">
               <a:rPr lang="en-US" smtClean="0"/>
-              <a:t>7/24/2020</a:t>
+              <a:t>7/27/2020</a:t>
             </a:fld>
             <a:endParaRPr lang="en-US" dirty="0"/>
           </a:p>
@@ -5963,36 +5963,6 @@
           </a:p>
         </p:txBody>
       </p:sp>
-      <p:pic>
-        <p:nvPicPr>
-          <p:cNvPr id="8" name="Picture 7">
-            <a:extLst>
-              <a:ext uri="{FF2B5EF4-FFF2-40B4-BE49-F238E27FC236}">
-                <a16:creationId xmlns:a16="http://schemas.microsoft.com/office/drawing/2014/main" id="{1E467101-AEBC-4FC3-8A0A-79C831F2AE0E}"/>
-              </a:ext>
-            </a:extLst>
-          </p:cNvPr>
-          <p:cNvPicPr>
-            <a:picLocks noChangeAspect="1"/>
-          </p:cNvPicPr>
-          <p:nvPr/>
-        </p:nvPicPr>
-        <p:blipFill>
-          <a:blip r:embed="rId2"/>
-          <a:stretch>
-            <a:fillRect/>
-          </a:stretch>
-        </p:blipFill>
-        <p:spPr>
-          <a:xfrm>
-            <a:off x="1524897" y="1387918"/>
-            <a:ext cx="412265" cy="446122"/>
-          </a:xfrm>
-          <a:prstGeom prst="rect">
-            <a:avLst/>
-          </a:prstGeom>
-        </p:spPr>
-      </p:pic>
       <p:sp>
         <p:nvSpPr>
           <p:cNvPr id="9" name="Rectangle 8">
@@ -6007,7 +5977,7 @@
         </p:nvSpPr>
         <p:spPr>
           <a:xfrm>
-            <a:off x="706829" y="2114126"/>
+            <a:off x="706829" y="1885516"/>
             <a:ext cx="2048403" cy="284205"/>
           </a:xfrm>
           <a:prstGeom prst="rect">
@@ -6059,36 +6029,6 @@
           </a:p>
         </p:txBody>
       </p:sp>
-      <p:pic>
-        <p:nvPicPr>
-          <p:cNvPr id="10" name="Picture 9">
-            <a:extLst>
-              <a:ext uri="{FF2B5EF4-FFF2-40B4-BE49-F238E27FC236}">
-                <a16:creationId xmlns:a16="http://schemas.microsoft.com/office/drawing/2014/main" id="{47E2730F-1823-4910-9D7C-CB84A2E3AAD0}"/>
-              </a:ext>
-            </a:extLst>
-          </p:cNvPr>
-          <p:cNvPicPr>
-            <a:picLocks noChangeAspect="1"/>
-          </p:cNvPicPr>
-          <p:nvPr/>
-        </p:nvPicPr>
-        <p:blipFill>
-          <a:blip r:embed="rId2"/>
-          <a:stretch>
-            <a:fillRect/>
-          </a:stretch>
-        </p:blipFill>
-        <p:spPr>
-          <a:xfrm>
-            <a:off x="4324245" y="1387918"/>
-            <a:ext cx="412265" cy="446122"/>
-          </a:xfrm>
-          <a:prstGeom prst="rect">
-            <a:avLst/>
-          </a:prstGeom>
-        </p:spPr>
-      </p:pic>
       <p:sp>
         <p:nvSpPr>
           <p:cNvPr id="13" name="Rectangle 12">
@@ -6103,7 +6043,7 @@
         </p:nvSpPr>
         <p:spPr>
           <a:xfrm>
-            <a:off x="3506177" y="2114126"/>
+            <a:off x="3506177" y="1885516"/>
             <a:ext cx="2048403" cy="284205"/>
           </a:xfrm>
           <a:prstGeom prst="rect">
@@ -6155,36 +6095,6 @@
           </a:p>
         </p:txBody>
       </p:sp>
-      <p:pic>
-        <p:nvPicPr>
-          <p:cNvPr id="14" name="Picture 13">
-            <a:extLst>
-              <a:ext uri="{FF2B5EF4-FFF2-40B4-BE49-F238E27FC236}">
-                <a16:creationId xmlns:a16="http://schemas.microsoft.com/office/drawing/2014/main" id="{29D90D82-5CC1-4F74-9524-D9458553C7E7}"/>
-              </a:ext>
-            </a:extLst>
-          </p:cNvPr>
-          <p:cNvPicPr>
-            <a:picLocks noChangeAspect="1"/>
-          </p:cNvPicPr>
-          <p:nvPr/>
-        </p:nvPicPr>
-        <p:blipFill>
-          <a:blip r:embed="rId2"/>
-          <a:stretch>
-            <a:fillRect/>
-          </a:stretch>
-        </p:blipFill>
-        <p:spPr>
-          <a:xfrm>
-            <a:off x="6720047" y="1387918"/>
-            <a:ext cx="412265" cy="446122"/>
-          </a:xfrm>
-          <a:prstGeom prst="rect">
-            <a:avLst/>
-          </a:prstGeom>
-        </p:spPr>
-      </p:pic>
       <p:sp>
         <p:nvSpPr>
           <p:cNvPr id="15" name="Rectangle 14">
@@ -6199,7 +6109,7 @@
         </p:nvSpPr>
         <p:spPr>
           <a:xfrm>
-            <a:off x="5901979" y="2114126"/>
+            <a:off x="5901979" y="1885516"/>
             <a:ext cx="2048403" cy="284205"/>
           </a:xfrm>
           <a:prstGeom prst="rect">
@@ -6251,36 +6161,6 @@
           </a:p>
         </p:txBody>
       </p:sp>
-      <p:pic>
-        <p:nvPicPr>
-          <p:cNvPr id="16" name="Picture 15">
-            <a:extLst>
-              <a:ext uri="{FF2B5EF4-FFF2-40B4-BE49-F238E27FC236}">
-                <a16:creationId xmlns:a16="http://schemas.microsoft.com/office/drawing/2014/main" id="{01AED54B-7BDC-435D-AF3B-3947E9E6044B}"/>
-              </a:ext>
-            </a:extLst>
-          </p:cNvPr>
-          <p:cNvPicPr>
-            <a:picLocks noChangeAspect="1"/>
-          </p:cNvPicPr>
-          <p:nvPr/>
-        </p:nvPicPr>
-        <p:blipFill>
-          <a:blip r:embed="rId2"/>
-          <a:stretch>
-            <a:fillRect/>
-          </a:stretch>
-        </p:blipFill>
-        <p:spPr>
-          <a:xfrm>
-            <a:off x="9180992" y="1387918"/>
-            <a:ext cx="412265" cy="446122"/>
-          </a:xfrm>
-          <a:prstGeom prst="rect">
-            <a:avLst/>
-          </a:prstGeom>
-        </p:spPr>
-      </p:pic>
       <p:sp>
         <p:nvSpPr>
           <p:cNvPr id="18" name="Rectangle 17">
@@ -6295,7 +6175,7 @@
         </p:nvSpPr>
         <p:spPr>
           <a:xfrm>
-            <a:off x="8362924" y="2114126"/>
+            <a:off x="8362924" y="1885516"/>
             <a:ext cx="2048403" cy="284205"/>
           </a:xfrm>
           <a:prstGeom prst="rect">
@@ -6362,7 +6242,7 @@
           <p:nvPr/>
         </p:nvPicPr>
         <p:blipFill>
-          <a:blip r:embed="rId3">
+          <a:blip r:embed="rId2">
             <a:extLst>
               <a:ext uri="{28A0092B-C50C-407E-A947-70E740481C1C}">
                 <a14:useLocalDpi xmlns:a14="http://schemas.microsoft.com/office/drawing/2010/main" val="0"/>
@@ -6376,7 +6256,7 @@
         </p:blipFill>
         <p:spPr bwMode="auto">
           <a:xfrm>
-            <a:off x="1474355" y="3095884"/>
+            <a:off x="1474355" y="2867274"/>
             <a:ext cx="513347" cy="513347"/>
           </a:xfrm>
           <a:prstGeom prst="rect">
@@ -6404,14 +6284,16 @@
             </a:extLst>
           </p:cNvPr>
           <p:cNvCxnSpPr>
-            <a:endCxn id="14" idx="1"/>
+            <a:cxnSpLocks/>
+            <a:stCxn id="61" idx="3"/>
+            <a:endCxn id="67" idx="1"/>
           </p:cNvCxnSpPr>
           <p:nvPr/>
         </p:nvCxnSpPr>
         <p:spPr>
           <a:xfrm>
-            <a:off x="4818648" y="1610979"/>
-            <a:ext cx="1901399" cy="0"/>
+            <a:off x="4990158" y="1374106"/>
+            <a:ext cx="1476242" cy="0"/>
           </a:xfrm>
           <a:prstGeom prst="straightConnector1">
             <a:avLst/>
@@ -6445,15 +6327,16 @@
             </a:extLst>
           </p:cNvPr>
           <p:cNvCxnSpPr>
-            <a:stCxn id="14" idx="3"/>
-            <a:endCxn id="16" idx="1"/>
+            <a:cxnSpLocks/>
+            <a:stCxn id="67" idx="3"/>
+            <a:endCxn id="72" idx="1"/>
           </p:cNvCxnSpPr>
           <p:nvPr/>
         </p:nvCxnSpPr>
         <p:spPr>
           <a:xfrm>
-            <a:off x="7132312" y="1610979"/>
-            <a:ext cx="2048680" cy="0"/>
+            <a:off x="7385960" y="1374106"/>
+            <a:ext cx="1541385" cy="0"/>
           </a:xfrm>
           <a:prstGeom prst="straightConnector1">
             <a:avLst/>
@@ -6494,7 +6377,7 @@
         </p:nvCxnSpPr>
         <p:spPr>
           <a:xfrm flipH="1">
-            <a:off x="1731029" y="2398331"/>
+            <a:off x="1731029" y="2169721"/>
             <a:ext cx="2" cy="697553"/>
           </a:xfrm>
           <a:prstGeom prst="straightConnector1">
@@ -6533,8 +6416,8 @@
         </p:nvSpPr>
         <p:spPr>
           <a:xfrm>
-            <a:off x="3503469" y="3013848"/>
-            <a:ext cx="8394898" cy="3662541"/>
+            <a:off x="3503469" y="2785238"/>
+            <a:ext cx="8394898" cy="3885679"/>
           </a:xfrm>
           <a:prstGeom prst="rect">
             <a:avLst/>
@@ -6548,7 +6431,7 @@
           <a:lstStyle/>
           <a:p>
             <a:r>
-              <a:rPr lang="en-US" sz="1400" dirty="0"/>
+              <a:rPr lang="en-US" sz="1050" b="1" dirty="0"/>
               <a:t>How this works:</a:t>
             </a:r>
           </a:p>
@@ -6558,7 +6441,7 @@
               <a:buChar char="•"/>
             </a:pPr>
             <a:r>
-              <a:rPr lang="en-US" sz="1200" dirty="0"/>
+              <a:rPr lang="en-US" sz="1100" dirty="0"/>
               <a:t>Development work is done in a Databricks workspace named “Work Area”</a:t>
             </a:r>
           </a:p>
@@ -6568,7 +6451,7 @@
               <a:buChar char="•"/>
             </a:pPr>
             <a:r>
-              <a:rPr lang="en-US" sz="1200" dirty="0"/>
+              <a:rPr lang="en-US" sz="1100" dirty="0"/>
               <a:t>The “Work Area” workspace is the only workspace tied to source control</a:t>
             </a:r>
           </a:p>
@@ -6578,7 +6461,7 @@
               <a:buChar char="•"/>
             </a:pPr>
             <a:r>
-              <a:rPr lang="en-US" sz="1200" dirty="0"/>
+              <a:rPr lang="en-US" sz="1100" dirty="0"/>
               <a:t>Dev/ QA / Prod are never used for development (they are “read-only”)</a:t>
             </a:r>
           </a:p>
@@ -6588,7 +6471,7 @@
               <a:buChar char="•"/>
             </a:pPr>
             <a:r>
-              <a:rPr lang="en-US" sz="1200" dirty="0"/>
+              <a:rPr lang="en-US" sz="1100" dirty="0"/>
               <a:t>The reason for a “Dev” workspace versus doing your development directly in Dev is so you can exercise your DevOps pipeline.</a:t>
             </a:r>
           </a:p>
@@ -6598,7 +6481,7 @@
               <a:buChar char="•"/>
             </a:pPr>
             <a:r>
-              <a:rPr lang="en-US" sz="1200" dirty="0"/>
+              <a:rPr lang="en-US" sz="1100" dirty="0"/>
               <a:t>Your DevOps pipeline will</a:t>
             </a:r>
           </a:p>
@@ -6608,8 +6491,8 @@
               <a:buChar char="•"/>
             </a:pPr>
             <a:r>
-              <a:rPr lang="en-US" sz="1200" dirty="0"/>
-              <a:t>Build</a:t>
+              <a:rPr lang="en-US" sz="1100" dirty="0"/>
+              <a:t>Build “Stage”</a:t>
             </a:r>
           </a:p>
           <a:p>
@@ -6618,7 +6501,7 @@
               <a:buChar char="•"/>
             </a:pPr>
             <a:r>
-              <a:rPr lang="en-US" sz="1200" dirty="0"/>
+              <a:rPr lang="en-US" sz="1100" dirty="0"/>
               <a:t>Compile and JAR files</a:t>
             </a:r>
           </a:p>
@@ -6628,7 +6511,7 @@
               <a:buChar char="•"/>
             </a:pPr>
             <a:r>
-              <a:rPr lang="en-US" sz="1200" dirty="0"/>
+              <a:rPr lang="en-US" sz="1100" dirty="0"/>
               <a:t>Package up your code/files into artifacts</a:t>
             </a:r>
           </a:p>
@@ -6638,8 +6521,8 @@
               <a:buChar char="•"/>
             </a:pPr>
             <a:r>
-              <a:rPr lang="en-US" sz="1200" dirty="0"/>
-              <a:t>Deploy</a:t>
+              <a:rPr lang="en-US" sz="1100" dirty="0"/>
+              <a:t>Deploy Stages (Dev -&gt; QA -&gt; Prod)</a:t>
             </a:r>
           </a:p>
           <a:p>
@@ -6648,7 +6531,7 @@
               <a:buChar char="•"/>
             </a:pPr>
             <a:r>
-              <a:rPr lang="en-US" sz="1200" dirty="0"/>
+              <a:rPr lang="en-US" sz="1100" dirty="0"/>
               <a:t>Create the Azure Databricks Workspace via ARM template</a:t>
             </a:r>
           </a:p>
@@ -6658,8 +6541,28 @@
               <a:buChar char="•"/>
             </a:pPr>
             <a:r>
-              <a:rPr lang="en-US" sz="1200" dirty="0"/>
-              <a:t>Deploy cluster definitions</a:t>
+              <a:rPr lang="en-US" sz="1100" dirty="0"/>
+              <a:t>Create the Azure KeyVault via ARM template </a:t>
+            </a:r>
+          </a:p>
+          <a:p>
+            <a:pPr marL="1714500" lvl="3" indent="-342900">
+              <a:buFont typeface="Arial" panose="020B0604020202020204" pitchFamily="34" charset="0"/>
+              <a:buChar char="•"/>
+            </a:pPr>
+            <a:r>
+              <a:rPr lang="en-US" sz="1100" dirty="0"/>
+              <a:t>The KeyVault holds the Service Principal for Databricks REST API</a:t>
+            </a:r>
+          </a:p>
+          <a:p>
+            <a:pPr marL="1714500" lvl="3" indent="-342900">
+              <a:buFont typeface="Arial" panose="020B0604020202020204" pitchFamily="34" charset="0"/>
+              <a:buChar char="•"/>
+            </a:pPr>
+            <a:r>
+              <a:rPr lang="en-US" sz="1100" dirty="0"/>
+              <a:t>The KeyVault can also be used for Databricks KeyVault backed secrets</a:t>
             </a:r>
           </a:p>
           <a:p>
@@ -6668,8 +6571,8 @@
               <a:buChar char="•"/>
             </a:pPr>
             <a:r>
-              <a:rPr lang="en-US" sz="1200" dirty="0"/>
-              <a:t>Deploy notebooks</a:t>
+              <a:rPr lang="en-US" sz="1100" dirty="0"/>
+              <a:t>Deploy cluster definitions</a:t>
             </a:r>
           </a:p>
           <a:p>
@@ -6678,16 +6581,8 @@
               <a:buChar char="•"/>
             </a:pPr>
             <a:r>
-              <a:rPr lang="en-US" sz="1200" dirty="0"/>
-              <a:t>Deploy </a:t>
-            </a:r>
-            <a:r>
-              <a:rPr lang="en-US" sz="1200" dirty="0" err="1"/>
-              <a:t>init</a:t>
-            </a:r>
-            <a:r>
-              <a:rPr lang="en-US" sz="1200" dirty="0"/>
-              <a:t>-scripts</a:t>
+              <a:rPr lang="en-US" sz="1100" dirty="0"/>
+              <a:t>Deploy notebooks</a:t>
             </a:r>
           </a:p>
           <a:p>
@@ -6696,16 +6591,16 @@
               <a:buChar char="•"/>
             </a:pPr>
             <a:r>
-              <a:rPr lang="en-US" sz="1200" dirty="0"/>
-              <a:t>Etc. (job, policies, </a:t>
-            </a:r>
-            <a:r>
-              <a:rPr lang="en-US" sz="1200" dirty="0" err="1"/>
-              <a:t>etc</a:t>
-            </a:r>
-            <a:r>
-              <a:rPr lang="en-US" sz="1200" dirty="0"/>
-              <a:t>, just cut and past the above sample deployment code)</a:t>
+              <a:rPr lang="en-US" sz="1100" dirty="0"/>
+              <a:t>Deploy </a:t>
+            </a:r>
+            <a:r>
+              <a:rPr lang="en-US" sz="1100" dirty="0" err="1"/>
+              <a:t>init</a:t>
+            </a:r>
+            <a:r>
+              <a:rPr lang="en-US" sz="1100" dirty="0"/>
+              <a:t>-scripts</a:t>
             </a:r>
           </a:p>
           <a:p>
@@ -6714,13 +6609,31 @@
               <a:buChar char="•"/>
             </a:pPr>
             <a:r>
-              <a:rPr lang="en-US" sz="1200" dirty="0"/>
+              <a:rPr lang="en-US" sz="1100" dirty="0"/>
+              <a:t>Etc. (job, policies, </a:t>
+            </a:r>
+            <a:r>
+              <a:rPr lang="en-US" sz="1100" dirty="0" err="1"/>
+              <a:t>etc</a:t>
+            </a:r>
+            <a:r>
+              <a:rPr lang="en-US" sz="1100" dirty="0"/>
+              <a:t>, just cut and past the above sample deployment code)</a:t>
+            </a:r>
+          </a:p>
+          <a:p>
+            <a:pPr marL="1257300" lvl="2" indent="-342900">
+              <a:buFont typeface="Arial" panose="020B0604020202020204" pitchFamily="34" charset="0"/>
+              <a:buChar char="•"/>
+            </a:pPr>
+            <a:r>
+              <a:rPr lang="en-US" sz="1100" dirty="0"/>
               <a:t>Push the deployment from Git to Dev, QA and Prod (you can set approval for each environment)</a:t>
             </a:r>
           </a:p>
           <a:p>
             <a:r>
-              <a:rPr lang="en-US" sz="1400" dirty="0"/>
+              <a:rPr lang="en-US" sz="1050" b="1" dirty="0"/>
               <a:t>Notes</a:t>
             </a:r>
           </a:p>
@@ -6730,7 +6643,7 @@
               <a:buChar char="•"/>
             </a:pPr>
             <a:r>
-              <a:rPr lang="en-US" sz="1200" dirty="0"/>
+              <a:rPr lang="en-US" sz="1100" dirty="0"/>
               <a:t>Dev, QA and Prod can be in different subscriptions.  You will need to create additional service connections.  The above sample deploys in a single subscription to different resource groups.</a:t>
             </a:r>
           </a:p>
@@ -6748,14 +6661,14 @@
           <p:cNvCxnSpPr>
             <a:cxnSpLocks/>
             <a:stCxn id="2050" idx="3"/>
-            <a:endCxn id="10" idx="1"/>
+            <a:endCxn id="61" idx="1"/>
           </p:cNvCxnSpPr>
           <p:nvPr/>
         </p:nvCxnSpPr>
         <p:spPr>
           <a:xfrm flipV="1">
-            <a:off x="1987702" y="1610979"/>
-            <a:ext cx="2336543" cy="1741579"/>
+            <a:off x="1987702" y="1374106"/>
+            <a:ext cx="2082896" cy="1749842"/>
           </a:xfrm>
           <a:prstGeom prst="bentConnector3">
             <a:avLst>
@@ -6795,7 +6708,7 @@
         </p:nvGrpSpPr>
         <p:grpSpPr>
           <a:xfrm>
-            <a:off x="1987702" y="3726784"/>
+            <a:off x="1987702" y="3498174"/>
             <a:ext cx="1327775" cy="261610"/>
             <a:chOff x="4345815" y="2302983"/>
             <a:chExt cx="1327775" cy="261610"/>
@@ -6816,7 +6729,7 @@
             <p:nvPr/>
           </p:nvPicPr>
           <p:blipFill>
-            <a:blip r:embed="rId4">
+            <a:blip r:embed="rId3">
               <a:extLst>
                 <a:ext uri="{28A0092B-C50C-407E-A947-70E740481C1C}">
                   <a14:useLocalDpi xmlns:a14="http://schemas.microsoft.com/office/drawing/2010/main" val="0"/>
@@ -6900,7 +6813,7 @@
         </p:nvCxnSpPr>
         <p:spPr>
           <a:xfrm rot="10800000">
-            <a:off x="1735066" y="3649680"/>
+            <a:off x="1735066" y="3421070"/>
             <a:ext cx="252637" cy="207911"/>
           </a:xfrm>
           <a:prstGeom prst="bentConnector2">
@@ -6936,7 +6849,7 @@
         </p:nvGrpSpPr>
         <p:grpSpPr>
           <a:xfrm>
-            <a:off x="1987702" y="3941580"/>
+            <a:off x="1987702" y="3712970"/>
             <a:ext cx="1042440" cy="261610"/>
             <a:chOff x="4345815" y="2302983"/>
             <a:chExt cx="1042440" cy="261610"/>
@@ -6957,7 +6870,7 @@
             <p:nvPr/>
           </p:nvPicPr>
           <p:blipFill>
-            <a:blip r:embed="rId4">
+            <a:blip r:embed="rId3">
               <a:extLst>
                 <a:ext uri="{28A0092B-C50C-407E-A947-70E740481C1C}">
                   <a14:useLocalDpi xmlns:a14="http://schemas.microsoft.com/office/drawing/2010/main" val="0"/>
@@ -7041,7 +6954,7 @@
         </p:nvCxnSpPr>
         <p:spPr>
           <a:xfrm rot="10800000">
-            <a:off x="1735066" y="3864476"/>
+            <a:off x="1735066" y="3635866"/>
             <a:ext cx="252637" cy="207911"/>
           </a:xfrm>
           <a:prstGeom prst="bentConnector2">
@@ -7077,7 +6990,7 @@
         </p:nvGrpSpPr>
         <p:grpSpPr>
           <a:xfrm>
-            <a:off x="1987540" y="4154056"/>
+            <a:off x="1987540" y="3925446"/>
             <a:ext cx="1036028" cy="261610"/>
             <a:chOff x="4345815" y="2302983"/>
             <a:chExt cx="1036028" cy="261610"/>
@@ -7098,7 +7011,7 @@
             <p:nvPr/>
           </p:nvPicPr>
           <p:blipFill>
-            <a:blip r:embed="rId4">
+            <a:blip r:embed="rId3">
               <a:extLst>
                 <a:ext uri="{28A0092B-C50C-407E-A947-70E740481C1C}">
                   <a14:useLocalDpi xmlns:a14="http://schemas.microsoft.com/office/drawing/2010/main" val="0"/>
@@ -7182,7 +7095,7 @@
         </p:nvCxnSpPr>
         <p:spPr>
           <a:xfrm rot="10800000">
-            <a:off x="1734904" y="4076952"/>
+            <a:off x="1734904" y="3848342"/>
             <a:ext cx="252637" cy="207911"/>
           </a:xfrm>
           <a:prstGeom prst="bentConnector2">
@@ -7218,7 +7131,7 @@
         </p:nvGrpSpPr>
         <p:grpSpPr>
           <a:xfrm>
-            <a:off x="1987540" y="4367403"/>
+            <a:off x="1987540" y="4138793"/>
             <a:ext cx="1236404" cy="261610"/>
             <a:chOff x="4345815" y="2302983"/>
             <a:chExt cx="1236404" cy="261610"/>
@@ -7239,7 +7152,7 @@
             <p:nvPr/>
           </p:nvPicPr>
           <p:blipFill>
-            <a:blip r:embed="rId4">
+            <a:blip r:embed="rId3">
               <a:extLst>
                 <a:ext uri="{28A0092B-C50C-407E-A947-70E740481C1C}">
                   <a14:useLocalDpi xmlns:a14="http://schemas.microsoft.com/office/drawing/2010/main" val="0"/>
@@ -7323,7 +7236,7 @@
         </p:nvCxnSpPr>
         <p:spPr>
           <a:xfrm rot="10800000">
-            <a:off x="1734904" y="4290299"/>
+            <a:off x="1734904" y="4061689"/>
             <a:ext cx="252637" cy="207911"/>
           </a:xfrm>
           <a:prstGeom prst="bentConnector2">
@@ -7359,7 +7272,7 @@
         </p:nvGrpSpPr>
         <p:grpSpPr>
           <a:xfrm>
-            <a:off x="1986787" y="4578393"/>
+            <a:off x="1986787" y="4349783"/>
             <a:ext cx="632071" cy="261610"/>
             <a:chOff x="4345815" y="2302983"/>
             <a:chExt cx="632071" cy="261610"/>
@@ -7380,7 +7293,7 @@
             <p:nvPr/>
           </p:nvPicPr>
           <p:blipFill>
-            <a:blip r:embed="rId4">
+            <a:blip r:embed="rId3">
               <a:extLst>
                 <a:ext uri="{28A0092B-C50C-407E-A947-70E740481C1C}">
                   <a14:useLocalDpi xmlns:a14="http://schemas.microsoft.com/office/drawing/2010/main" val="0"/>
@@ -7464,7 +7377,7 @@
         </p:nvCxnSpPr>
         <p:spPr>
           <a:xfrm rot="10800000">
-            <a:off x="1734151" y="4501289"/>
+            <a:off x="1734151" y="4272679"/>
             <a:ext cx="252637" cy="207911"/>
           </a:xfrm>
           <a:prstGeom prst="bentConnector2">
@@ -7488,112 +7401,1555 @@
       </p:cxnSp>
       <p:pic>
         <p:nvPicPr>
-          <p:cNvPr id="4" name="Picture 3" descr="A picture containing drawing&#10;&#10;Description automatically generated">
+          <p:cNvPr id="1026" name="Picture 2" descr="See the source image">
             <a:extLst>
               <a:ext uri="{FF2B5EF4-FFF2-40B4-BE49-F238E27FC236}">
-                <a16:creationId xmlns:a16="http://schemas.microsoft.com/office/drawing/2014/main" id="{1D0F03FB-9549-4B42-A206-B61CA6C4D3DB}"/>
+                <a16:creationId xmlns:a16="http://schemas.microsoft.com/office/drawing/2014/main" id="{A431CEB9-FF13-44E2-8F43-17AF80D69CA8}"/>
               </a:ext>
             </a:extLst>
           </p:cNvPr>
           <p:cNvPicPr>
-            <a:picLocks noChangeAspect="1"/>
+            <a:picLocks noChangeAspect="1" noChangeArrowheads="1"/>
           </p:cNvPicPr>
           <p:nvPr/>
         </p:nvPicPr>
         <p:blipFill>
-          <a:blip r:embed="rId5">
+          <a:blip r:embed="rId4">
             <a:extLst>
               <a:ext uri="{28A0092B-C50C-407E-A947-70E740481C1C}">
                 <a14:useLocalDpi xmlns:a14="http://schemas.microsoft.com/office/drawing/2010/main" val="0"/>
               </a:ext>
             </a:extLst>
           </a:blip>
+          <a:srcRect/>
           <a:stretch>
             <a:fillRect/>
           </a:stretch>
         </p:blipFill>
-        <p:spPr>
+        <p:spPr bwMode="auto">
           <a:xfrm>
-            <a:off x="4369835" y="2539746"/>
-            <a:ext cx="361731" cy="361731"/>
+            <a:off x="2882774" y="1876509"/>
+            <a:ext cx="302217" cy="302217"/>
           </a:xfrm>
           <a:prstGeom prst="rect">
             <a:avLst/>
           </a:prstGeom>
+          <a:noFill/>
+          <a:extLst>
+            <a:ext uri="{909E8E84-426E-40DD-AFC4-6F175D3DCCD1}">
+              <a14:hiddenFill xmlns:a14="http://schemas.microsoft.com/office/drawing/2010/main">
+                <a:solidFill>
+                  <a:srgbClr val="FFFFFF"/>
+                </a:solidFill>
+              </a14:hiddenFill>
+            </a:ext>
+          </a:extLst>
         </p:spPr>
       </p:pic>
-      <p:pic>
-        <p:nvPicPr>
-          <p:cNvPr id="6" name="Picture 5" descr="A picture containing drawing&#10;&#10;Description automatically generated">
+      <p:grpSp>
+        <p:nvGrpSpPr>
+          <p:cNvPr id="52" name="Group 51">
             <a:extLst>
               <a:ext uri="{FF2B5EF4-FFF2-40B4-BE49-F238E27FC236}">
-                <a16:creationId xmlns:a16="http://schemas.microsoft.com/office/drawing/2014/main" id="{BA0FC9D7-472A-4921-9B33-05AD1E8335D0}"/>
+                <a16:creationId xmlns:a16="http://schemas.microsoft.com/office/drawing/2014/main" id="{C7F4FF5B-031D-42F5-AD32-E743DE655054}"/>
               </a:ext>
             </a:extLst>
           </p:cNvPr>
-          <p:cNvPicPr>
-            <a:picLocks noChangeAspect="1"/>
-          </p:cNvPicPr>
+          <p:cNvGrpSpPr/>
           <p:nvPr/>
-        </p:nvPicPr>
-        <p:blipFill>
-          <a:blip r:embed="rId5">
-            <a:extLst>
-              <a:ext uri="{28A0092B-C50C-407E-A947-70E740481C1C}">
-                <a14:useLocalDpi xmlns:a14="http://schemas.microsoft.com/office/drawing/2010/main" val="0"/>
-              </a:ext>
-            </a:extLst>
-          </a:blip>
-          <a:stretch>
-            <a:fillRect/>
-          </a:stretch>
-        </p:blipFill>
-        <p:spPr>
+        </p:nvGrpSpPr>
+        <p:grpSpPr>
           <a:xfrm>
-            <a:off x="6770581" y="2539746"/>
-            <a:ext cx="361731" cy="361731"/>
+            <a:off x="4032330" y="1072084"/>
+            <a:ext cx="996097" cy="604044"/>
+            <a:chOff x="1661583" y="5161658"/>
+            <a:chExt cx="996097" cy="604044"/>
           </a:xfrm>
-          <a:prstGeom prst="rect">
-            <a:avLst/>
-          </a:prstGeom>
-        </p:spPr>
-      </p:pic>
-      <p:pic>
-        <p:nvPicPr>
-          <p:cNvPr id="11" name="Picture 10" descr="A picture containing drawing&#10;&#10;Description automatically generated">
+        </p:grpSpPr>
+        <p:sp>
+          <p:nvSpPr>
+            <p:cNvPr id="61" name="Rectangle: Rounded Corners 60">
+              <a:extLst>
+                <a:ext uri="{FF2B5EF4-FFF2-40B4-BE49-F238E27FC236}">
+                  <a16:creationId xmlns:a16="http://schemas.microsoft.com/office/drawing/2014/main" id="{CE8EFCBF-82EE-4F37-98A1-57E65797FA3F}"/>
+                </a:ext>
+              </a:extLst>
+            </p:cNvPr>
+            <p:cNvSpPr/>
+            <p:nvPr/>
+          </p:nvSpPr>
+          <p:spPr>
+            <a:xfrm>
+              <a:off x="1699851" y="5161658"/>
+              <a:ext cx="919560" cy="604044"/>
+            </a:xfrm>
+            <a:prstGeom prst="roundRect">
+              <a:avLst/>
+            </a:prstGeom>
+            <a:noFill/>
+            <a:ln>
+              <a:solidFill>
+                <a:srgbClr val="0070C0"/>
+              </a:solidFill>
+              <a:prstDash val="sysDot"/>
+              <a:extLst>
+                <a:ext uri="{C807C97D-BFC1-408E-A445-0C87EB9F89A2}">
+                  <ask:lineSketchStyleProps xmlns:ask="http://schemas.microsoft.com/office/drawing/2018/sketchyshapes" sd="1219033472">
+                    <a:custGeom>
+                      <a:avLst/>
+                      <a:gdLst>
+                        <a:gd name="connsiteX0" fmla="*/ 0 w 1060525"/>
+                        <a:gd name="connsiteY0" fmla="*/ 158238 h 949411"/>
+                        <a:gd name="connsiteX1" fmla="*/ 158238 w 1060525"/>
+                        <a:gd name="connsiteY1" fmla="*/ 0 h 949411"/>
+                        <a:gd name="connsiteX2" fmla="*/ 545143 w 1060525"/>
+                        <a:gd name="connsiteY2" fmla="*/ 0 h 949411"/>
+                        <a:gd name="connsiteX3" fmla="*/ 902287 w 1060525"/>
+                        <a:gd name="connsiteY3" fmla="*/ 0 h 949411"/>
+                        <a:gd name="connsiteX4" fmla="*/ 1060525 w 1060525"/>
+                        <a:gd name="connsiteY4" fmla="*/ 158238 h 949411"/>
+                        <a:gd name="connsiteX5" fmla="*/ 1060525 w 1060525"/>
+                        <a:gd name="connsiteY5" fmla="*/ 462047 h 949411"/>
+                        <a:gd name="connsiteX6" fmla="*/ 1060525 w 1060525"/>
+                        <a:gd name="connsiteY6" fmla="*/ 791173 h 949411"/>
+                        <a:gd name="connsiteX7" fmla="*/ 902287 w 1060525"/>
+                        <a:gd name="connsiteY7" fmla="*/ 949411 h 949411"/>
+                        <a:gd name="connsiteX8" fmla="*/ 545143 w 1060525"/>
+                        <a:gd name="connsiteY8" fmla="*/ 949411 h 949411"/>
+                        <a:gd name="connsiteX9" fmla="*/ 158238 w 1060525"/>
+                        <a:gd name="connsiteY9" fmla="*/ 949411 h 949411"/>
+                        <a:gd name="connsiteX10" fmla="*/ 0 w 1060525"/>
+                        <a:gd name="connsiteY10" fmla="*/ 791173 h 949411"/>
+                        <a:gd name="connsiteX11" fmla="*/ 0 w 1060525"/>
+                        <a:gd name="connsiteY11" fmla="*/ 493694 h 949411"/>
+                        <a:gd name="connsiteX12" fmla="*/ 0 w 1060525"/>
+                        <a:gd name="connsiteY12" fmla="*/ 158238 h 949411"/>
+                      </a:gdLst>
+                      <a:ahLst/>
+                      <a:cxnLst>
+                        <a:cxn ang="0">
+                          <a:pos x="connsiteX0" y="connsiteY0"/>
+                        </a:cxn>
+                        <a:cxn ang="0">
+                          <a:pos x="connsiteX1" y="connsiteY1"/>
+                        </a:cxn>
+                        <a:cxn ang="0">
+                          <a:pos x="connsiteX2" y="connsiteY2"/>
+                        </a:cxn>
+                        <a:cxn ang="0">
+                          <a:pos x="connsiteX3" y="connsiteY3"/>
+                        </a:cxn>
+                        <a:cxn ang="0">
+                          <a:pos x="connsiteX4" y="connsiteY4"/>
+                        </a:cxn>
+                        <a:cxn ang="0">
+                          <a:pos x="connsiteX5" y="connsiteY5"/>
+                        </a:cxn>
+                        <a:cxn ang="0">
+                          <a:pos x="connsiteX6" y="connsiteY6"/>
+                        </a:cxn>
+                        <a:cxn ang="0">
+                          <a:pos x="connsiteX7" y="connsiteY7"/>
+                        </a:cxn>
+                        <a:cxn ang="0">
+                          <a:pos x="connsiteX8" y="connsiteY8"/>
+                        </a:cxn>
+                        <a:cxn ang="0">
+                          <a:pos x="connsiteX9" y="connsiteY9"/>
+                        </a:cxn>
+                        <a:cxn ang="0">
+                          <a:pos x="connsiteX10" y="connsiteY10"/>
+                        </a:cxn>
+                        <a:cxn ang="0">
+                          <a:pos x="connsiteX11" y="connsiteY11"/>
+                        </a:cxn>
+                        <a:cxn ang="0">
+                          <a:pos x="connsiteX12" y="connsiteY12"/>
+                        </a:cxn>
+                      </a:cxnLst>
+                      <a:rect l="l" t="t" r="r" b="b"/>
+                      <a:pathLst>
+                        <a:path w="1060525" h="949411" extrusionOk="0">
+                          <a:moveTo>
+                            <a:pt x="0" y="158238"/>
+                          </a:moveTo>
+                          <a:cubicBezTo>
+                            <a:pt x="-6968" y="66548"/>
+                            <a:pt x="48378" y="8433"/>
+                            <a:pt x="158238" y="0"/>
+                          </a:cubicBezTo>
+                          <a:cubicBezTo>
+                            <a:pt x="349666" y="-16998"/>
+                            <a:pt x="425630" y="45732"/>
+                            <a:pt x="545143" y="0"/>
+                          </a:cubicBezTo>
+                          <a:cubicBezTo>
+                            <a:pt x="664657" y="-45732"/>
+                            <a:pt x="820159" y="12596"/>
+                            <a:pt x="902287" y="0"/>
+                          </a:cubicBezTo>
+                          <a:cubicBezTo>
+                            <a:pt x="971578" y="-9904"/>
+                            <a:pt x="1073159" y="76883"/>
+                            <a:pt x="1060525" y="158238"/>
+                          </a:cubicBezTo>
+                          <a:cubicBezTo>
+                            <a:pt x="1070157" y="289612"/>
+                            <a:pt x="1042806" y="329690"/>
+                            <a:pt x="1060525" y="462047"/>
+                          </a:cubicBezTo>
+                          <a:cubicBezTo>
+                            <a:pt x="1078244" y="594404"/>
+                            <a:pt x="1038376" y="643113"/>
+                            <a:pt x="1060525" y="791173"/>
+                          </a:cubicBezTo>
+                          <a:cubicBezTo>
+                            <a:pt x="1059057" y="864564"/>
+                            <a:pt x="981426" y="960880"/>
+                            <a:pt x="902287" y="949411"/>
+                          </a:cubicBezTo>
+                          <a:cubicBezTo>
+                            <a:pt x="753690" y="960561"/>
+                            <a:pt x="631505" y="915417"/>
+                            <a:pt x="545143" y="949411"/>
+                          </a:cubicBezTo>
+                          <a:cubicBezTo>
+                            <a:pt x="458781" y="983405"/>
+                            <a:pt x="339279" y="911965"/>
+                            <a:pt x="158238" y="949411"/>
+                          </a:cubicBezTo>
+                          <a:cubicBezTo>
+                            <a:pt x="73589" y="953494"/>
+                            <a:pt x="1058" y="889527"/>
+                            <a:pt x="0" y="791173"/>
+                          </a:cubicBezTo>
+                          <a:cubicBezTo>
+                            <a:pt x="-31957" y="731446"/>
+                            <a:pt x="21377" y="595516"/>
+                            <a:pt x="0" y="493694"/>
+                          </a:cubicBezTo>
+                          <a:cubicBezTo>
+                            <a:pt x="-21377" y="391872"/>
+                            <a:pt x="35644" y="296102"/>
+                            <a:pt x="0" y="158238"/>
+                          </a:cubicBezTo>
+                          <a:close/>
+                        </a:path>
+                      </a:pathLst>
+                    </a:custGeom>
+                    <ask:type>
+                      <ask:lineSketchNone/>
+                    </ask:type>
+                  </ask:lineSketchStyleProps>
+                </a:ext>
+              </a:extLst>
+            </a:ln>
+          </p:spPr>
+          <p:style>
+            <a:lnRef idx="2">
+              <a:schemeClr val="accent1">
+                <a:shade val="50000"/>
+              </a:schemeClr>
+            </a:lnRef>
+            <a:fillRef idx="1">
+              <a:schemeClr val="accent1"/>
+            </a:fillRef>
+            <a:effectRef idx="0">
+              <a:schemeClr val="accent1"/>
+            </a:effectRef>
+            <a:fontRef idx="minor">
+              <a:schemeClr val="lt1"/>
+            </a:fontRef>
+          </p:style>
+          <p:txBody>
+            <a:bodyPr rtlCol="0" anchor="ctr"/>
+            <a:lstStyle/>
+            <a:p>
+              <a:pPr marL="0" marR="0" lvl="0" indent="0" algn="ctr" defTabSz="914400" rtl="0" eaLnBrk="1" fontAlgn="auto" latinLnBrk="0" hangingPunct="1">
+                <a:lnSpc>
+                  <a:spcPct val="100000"/>
+                </a:lnSpc>
+                <a:spcBef>
+                  <a:spcPts val="0"/>
+                </a:spcBef>
+                <a:spcAft>
+                  <a:spcPts val="0"/>
+                </a:spcAft>
+                <a:buClrTx/>
+                <a:buSzTx/>
+                <a:buFontTx/>
+                <a:buNone/>
+                <a:tabLst/>
+                <a:defRPr/>
+              </a:pPr>
+              <a:endParaRPr kumimoji="0" lang="en-US" sz="1800" b="0" i="0" u="none" strike="noStrike" kern="1200" cap="none" spc="0" normalizeH="0" baseline="0" noProof="0">
+                <a:ln>
+                  <a:noFill/>
+                </a:ln>
+                <a:solidFill>
+                  <a:prstClr val="white"/>
+                </a:solidFill>
+                <a:effectLst/>
+                <a:uLnTx/>
+                <a:uFillTx/>
+                <a:latin typeface="Segoe UI"/>
+                <a:ea typeface="+mn-ea"/>
+                <a:cs typeface="+mn-cs"/>
+              </a:endParaRPr>
+            </a:p>
+          </p:txBody>
+        </p:sp>
+        <p:sp>
+          <p:nvSpPr>
+            <p:cNvPr id="62" name="TextBox 61">
+              <a:extLst>
+                <a:ext uri="{FF2B5EF4-FFF2-40B4-BE49-F238E27FC236}">
+                  <a16:creationId xmlns:a16="http://schemas.microsoft.com/office/drawing/2014/main" id="{70322CF2-642A-4362-9F40-AC9367FA9AF1}"/>
+                </a:ext>
+              </a:extLst>
+            </p:cNvPr>
+            <p:cNvSpPr txBox="1"/>
+            <p:nvPr/>
+          </p:nvSpPr>
+          <p:spPr>
+            <a:xfrm>
+              <a:off x="1661583" y="5536107"/>
+              <a:ext cx="996097" cy="215444"/>
+            </a:xfrm>
+            <a:prstGeom prst="rect">
+              <a:avLst/>
+            </a:prstGeom>
+            <a:noFill/>
+          </p:spPr>
+          <p:txBody>
+            <a:bodyPr wrap="square" rtlCol="0">
+              <a:spAutoFit/>
+            </a:bodyPr>
+            <a:lstStyle/>
+            <a:p>
+              <a:pPr marL="0" marR="0" lvl="0" indent="0" algn="ctr" defTabSz="914400" rtl="0" eaLnBrk="1" fontAlgn="auto" latinLnBrk="0" hangingPunct="1">
+                <a:lnSpc>
+                  <a:spcPct val="100000"/>
+                </a:lnSpc>
+                <a:spcBef>
+                  <a:spcPts val="0"/>
+                </a:spcBef>
+                <a:spcAft>
+                  <a:spcPts val="0"/>
+                </a:spcAft>
+                <a:buClrTx/>
+                <a:buSzTx/>
+                <a:buFontTx/>
+                <a:buNone/>
+                <a:tabLst/>
+                <a:defRPr/>
+              </a:pPr>
+              <a:r>
+                <a:rPr kumimoji="0" lang="en-US" sz="800" b="0" i="0" u="none" strike="noStrike" kern="1200" cap="none" spc="0" normalizeH="0" baseline="0" noProof="0" dirty="0">
+                  <a:ln>
+                    <a:noFill/>
+                  </a:ln>
+                  <a:solidFill>
+                    <a:prstClr val="black"/>
+                  </a:solidFill>
+                  <a:effectLst/>
+                  <a:uLnTx/>
+                  <a:uFillTx/>
+                  <a:latin typeface="Segoe UI Semibold" panose="020B0702040204020203" pitchFamily="34" charset="0"/>
+                  <a:ea typeface="+mn-ea"/>
+                  <a:cs typeface="Segoe UI Semibold" panose="020B0702040204020203" pitchFamily="34" charset="0"/>
+                </a:rPr>
+                <a:t>Azure</a:t>
+              </a:r>
+            </a:p>
+          </p:txBody>
+        </p:sp>
+        <p:pic>
+          <p:nvPicPr>
+            <p:cNvPr id="40" name="Picture 39">
+              <a:extLst>
+                <a:ext uri="{FF2B5EF4-FFF2-40B4-BE49-F238E27FC236}">
+                  <a16:creationId xmlns:a16="http://schemas.microsoft.com/office/drawing/2014/main" id="{E81B8272-3EE3-434E-8AFD-0148B7BBFB0D}"/>
+                </a:ext>
+              </a:extLst>
+            </p:cNvPr>
+            <p:cNvPicPr>
+              <a:picLocks noChangeAspect="1"/>
+            </p:cNvPicPr>
+            <p:nvPr/>
+          </p:nvPicPr>
+          <p:blipFill>
+            <a:blip r:embed="rId5"/>
+            <a:stretch>
+              <a:fillRect/>
+            </a:stretch>
+          </p:blipFill>
+          <p:spPr>
+            <a:xfrm>
+              <a:off x="2178380" y="5241845"/>
+              <a:ext cx="258853" cy="280111"/>
+            </a:xfrm>
+            <a:prstGeom prst="rect">
+              <a:avLst/>
+            </a:prstGeom>
+          </p:spPr>
+        </p:pic>
+        <p:pic>
+          <p:nvPicPr>
+            <p:cNvPr id="41" name="Picture 40" descr="A picture containing drawing&#10;&#10;Description automatically generated">
+              <a:extLst>
+                <a:ext uri="{FF2B5EF4-FFF2-40B4-BE49-F238E27FC236}">
+                  <a16:creationId xmlns:a16="http://schemas.microsoft.com/office/drawing/2014/main" id="{D1CF3BE0-EE01-4754-8189-7EE67FE8820A}"/>
+                </a:ext>
+              </a:extLst>
+            </p:cNvPr>
+            <p:cNvPicPr>
+              <a:picLocks noChangeAspect="1"/>
+            </p:cNvPicPr>
+            <p:nvPr/>
+          </p:nvPicPr>
+          <p:blipFill>
+            <a:blip r:embed="rId6">
+              <a:extLst>
+                <a:ext uri="{28A0092B-C50C-407E-A947-70E740481C1C}">
+                  <a14:useLocalDpi xmlns:a14="http://schemas.microsoft.com/office/drawing/2010/main" val="0"/>
+                </a:ext>
+              </a:extLst>
+            </a:blip>
+            <a:stretch>
+              <a:fillRect/>
+            </a:stretch>
+          </p:blipFill>
+          <p:spPr>
+            <a:xfrm>
+              <a:off x="1842381" y="5250369"/>
+              <a:ext cx="244558" cy="244558"/>
+            </a:xfrm>
+            <a:prstGeom prst="rect">
+              <a:avLst/>
+            </a:prstGeom>
+          </p:spPr>
+        </p:pic>
+      </p:grpSp>
+      <p:grpSp>
+        <p:nvGrpSpPr>
+          <p:cNvPr id="66" name="Group 65">
             <a:extLst>
               <a:ext uri="{FF2B5EF4-FFF2-40B4-BE49-F238E27FC236}">
-                <a16:creationId xmlns:a16="http://schemas.microsoft.com/office/drawing/2014/main" id="{4287654D-F8F3-49E5-AFA5-84E7D931162F}"/>
+                <a16:creationId xmlns:a16="http://schemas.microsoft.com/office/drawing/2014/main" id="{FF9DBBF1-1465-44C4-882D-A8E96525EB97}"/>
               </a:ext>
             </a:extLst>
           </p:cNvPr>
-          <p:cNvPicPr>
-            <a:picLocks noChangeAspect="1"/>
-          </p:cNvPicPr>
+          <p:cNvGrpSpPr/>
           <p:nvPr/>
-        </p:nvPicPr>
-        <p:blipFill>
-          <a:blip r:embed="rId5">
-            <a:extLst>
-              <a:ext uri="{28A0092B-C50C-407E-A947-70E740481C1C}">
-                <a14:useLocalDpi xmlns:a14="http://schemas.microsoft.com/office/drawing/2010/main" val="0"/>
-              </a:ext>
-            </a:extLst>
-          </a:blip>
-          <a:stretch>
-            <a:fillRect/>
-          </a:stretch>
-        </p:blipFill>
-        <p:spPr>
+        </p:nvGrpSpPr>
+        <p:grpSpPr>
           <a:xfrm>
-            <a:off x="9231526" y="2525224"/>
-            <a:ext cx="361731" cy="361731"/>
+            <a:off x="6428132" y="1072084"/>
+            <a:ext cx="996097" cy="604044"/>
+            <a:chOff x="1661583" y="5161658"/>
+            <a:chExt cx="996097" cy="604044"/>
           </a:xfrm>
-          <a:prstGeom prst="rect">
-            <a:avLst/>
-          </a:prstGeom>
-        </p:spPr>
-      </p:pic>
+        </p:grpSpPr>
+        <p:sp>
+          <p:nvSpPr>
+            <p:cNvPr id="67" name="Rectangle: Rounded Corners 66">
+              <a:extLst>
+                <a:ext uri="{FF2B5EF4-FFF2-40B4-BE49-F238E27FC236}">
+                  <a16:creationId xmlns:a16="http://schemas.microsoft.com/office/drawing/2014/main" id="{9A5E15A9-4984-4C35-944E-EE7927024F0F}"/>
+                </a:ext>
+              </a:extLst>
+            </p:cNvPr>
+            <p:cNvSpPr/>
+            <p:nvPr/>
+          </p:nvSpPr>
+          <p:spPr>
+            <a:xfrm>
+              <a:off x="1699851" y="5161658"/>
+              <a:ext cx="919560" cy="604044"/>
+            </a:xfrm>
+            <a:prstGeom prst="roundRect">
+              <a:avLst/>
+            </a:prstGeom>
+            <a:noFill/>
+            <a:ln>
+              <a:solidFill>
+                <a:srgbClr val="0070C0"/>
+              </a:solidFill>
+              <a:prstDash val="sysDot"/>
+              <a:extLst>
+                <a:ext uri="{C807C97D-BFC1-408E-A445-0C87EB9F89A2}">
+                  <ask:lineSketchStyleProps xmlns:ask="http://schemas.microsoft.com/office/drawing/2018/sketchyshapes" sd="1219033472">
+                    <a:custGeom>
+                      <a:avLst/>
+                      <a:gdLst>
+                        <a:gd name="connsiteX0" fmla="*/ 0 w 1060525"/>
+                        <a:gd name="connsiteY0" fmla="*/ 158238 h 949411"/>
+                        <a:gd name="connsiteX1" fmla="*/ 158238 w 1060525"/>
+                        <a:gd name="connsiteY1" fmla="*/ 0 h 949411"/>
+                        <a:gd name="connsiteX2" fmla="*/ 545143 w 1060525"/>
+                        <a:gd name="connsiteY2" fmla="*/ 0 h 949411"/>
+                        <a:gd name="connsiteX3" fmla="*/ 902287 w 1060525"/>
+                        <a:gd name="connsiteY3" fmla="*/ 0 h 949411"/>
+                        <a:gd name="connsiteX4" fmla="*/ 1060525 w 1060525"/>
+                        <a:gd name="connsiteY4" fmla="*/ 158238 h 949411"/>
+                        <a:gd name="connsiteX5" fmla="*/ 1060525 w 1060525"/>
+                        <a:gd name="connsiteY5" fmla="*/ 462047 h 949411"/>
+                        <a:gd name="connsiteX6" fmla="*/ 1060525 w 1060525"/>
+                        <a:gd name="connsiteY6" fmla="*/ 791173 h 949411"/>
+                        <a:gd name="connsiteX7" fmla="*/ 902287 w 1060525"/>
+                        <a:gd name="connsiteY7" fmla="*/ 949411 h 949411"/>
+                        <a:gd name="connsiteX8" fmla="*/ 545143 w 1060525"/>
+                        <a:gd name="connsiteY8" fmla="*/ 949411 h 949411"/>
+                        <a:gd name="connsiteX9" fmla="*/ 158238 w 1060525"/>
+                        <a:gd name="connsiteY9" fmla="*/ 949411 h 949411"/>
+                        <a:gd name="connsiteX10" fmla="*/ 0 w 1060525"/>
+                        <a:gd name="connsiteY10" fmla="*/ 791173 h 949411"/>
+                        <a:gd name="connsiteX11" fmla="*/ 0 w 1060525"/>
+                        <a:gd name="connsiteY11" fmla="*/ 493694 h 949411"/>
+                        <a:gd name="connsiteX12" fmla="*/ 0 w 1060525"/>
+                        <a:gd name="connsiteY12" fmla="*/ 158238 h 949411"/>
+                      </a:gdLst>
+                      <a:ahLst/>
+                      <a:cxnLst>
+                        <a:cxn ang="0">
+                          <a:pos x="connsiteX0" y="connsiteY0"/>
+                        </a:cxn>
+                        <a:cxn ang="0">
+                          <a:pos x="connsiteX1" y="connsiteY1"/>
+                        </a:cxn>
+                        <a:cxn ang="0">
+                          <a:pos x="connsiteX2" y="connsiteY2"/>
+                        </a:cxn>
+                        <a:cxn ang="0">
+                          <a:pos x="connsiteX3" y="connsiteY3"/>
+                        </a:cxn>
+                        <a:cxn ang="0">
+                          <a:pos x="connsiteX4" y="connsiteY4"/>
+                        </a:cxn>
+                        <a:cxn ang="0">
+                          <a:pos x="connsiteX5" y="connsiteY5"/>
+                        </a:cxn>
+                        <a:cxn ang="0">
+                          <a:pos x="connsiteX6" y="connsiteY6"/>
+                        </a:cxn>
+                        <a:cxn ang="0">
+                          <a:pos x="connsiteX7" y="connsiteY7"/>
+                        </a:cxn>
+                        <a:cxn ang="0">
+                          <a:pos x="connsiteX8" y="connsiteY8"/>
+                        </a:cxn>
+                        <a:cxn ang="0">
+                          <a:pos x="connsiteX9" y="connsiteY9"/>
+                        </a:cxn>
+                        <a:cxn ang="0">
+                          <a:pos x="connsiteX10" y="connsiteY10"/>
+                        </a:cxn>
+                        <a:cxn ang="0">
+                          <a:pos x="connsiteX11" y="connsiteY11"/>
+                        </a:cxn>
+                        <a:cxn ang="0">
+                          <a:pos x="connsiteX12" y="connsiteY12"/>
+                        </a:cxn>
+                      </a:cxnLst>
+                      <a:rect l="l" t="t" r="r" b="b"/>
+                      <a:pathLst>
+                        <a:path w="1060525" h="949411" extrusionOk="0">
+                          <a:moveTo>
+                            <a:pt x="0" y="158238"/>
+                          </a:moveTo>
+                          <a:cubicBezTo>
+                            <a:pt x="-6968" y="66548"/>
+                            <a:pt x="48378" y="8433"/>
+                            <a:pt x="158238" y="0"/>
+                          </a:cubicBezTo>
+                          <a:cubicBezTo>
+                            <a:pt x="349666" y="-16998"/>
+                            <a:pt x="425630" y="45732"/>
+                            <a:pt x="545143" y="0"/>
+                          </a:cubicBezTo>
+                          <a:cubicBezTo>
+                            <a:pt x="664657" y="-45732"/>
+                            <a:pt x="820159" y="12596"/>
+                            <a:pt x="902287" y="0"/>
+                          </a:cubicBezTo>
+                          <a:cubicBezTo>
+                            <a:pt x="971578" y="-9904"/>
+                            <a:pt x="1073159" y="76883"/>
+                            <a:pt x="1060525" y="158238"/>
+                          </a:cubicBezTo>
+                          <a:cubicBezTo>
+                            <a:pt x="1070157" y="289612"/>
+                            <a:pt x="1042806" y="329690"/>
+                            <a:pt x="1060525" y="462047"/>
+                          </a:cubicBezTo>
+                          <a:cubicBezTo>
+                            <a:pt x="1078244" y="594404"/>
+                            <a:pt x="1038376" y="643113"/>
+                            <a:pt x="1060525" y="791173"/>
+                          </a:cubicBezTo>
+                          <a:cubicBezTo>
+                            <a:pt x="1059057" y="864564"/>
+                            <a:pt x="981426" y="960880"/>
+                            <a:pt x="902287" y="949411"/>
+                          </a:cubicBezTo>
+                          <a:cubicBezTo>
+                            <a:pt x="753690" y="960561"/>
+                            <a:pt x="631505" y="915417"/>
+                            <a:pt x="545143" y="949411"/>
+                          </a:cubicBezTo>
+                          <a:cubicBezTo>
+                            <a:pt x="458781" y="983405"/>
+                            <a:pt x="339279" y="911965"/>
+                            <a:pt x="158238" y="949411"/>
+                          </a:cubicBezTo>
+                          <a:cubicBezTo>
+                            <a:pt x="73589" y="953494"/>
+                            <a:pt x="1058" y="889527"/>
+                            <a:pt x="0" y="791173"/>
+                          </a:cubicBezTo>
+                          <a:cubicBezTo>
+                            <a:pt x="-31957" y="731446"/>
+                            <a:pt x="21377" y="595516"/>
+                            <a:pt x="0" y="493694"/>
+                          </a:cubicBezTo>
+                          <a:cubicBezTo>
+                            <a:pt x="-21377" y="391872"/>
+                            <a:pt x="35644" y="296102"/>
+                            <a:pt x="0" y="158238"/>
+                          </a:cubicBezTo>
+                          <a:close/>
+                        </a:path>
+                      </a:pathLst>
+                    </a:custGeom>
+                    <ask:type>
+                      <ask:lineSketchNone/>
+                    </ask:type>
+                  </ask:lineSketchStyleProps>
+                </a:ext>
+              </a:extLst>
+            </a:ln>
+          </p:spPr>
+          <p:style>
+            <a:lnRef idx="2">
+              <a:schemeClr val="accent1">
+                <a:shade val="50000"/>
+              </a:schemeClr>
+            </a:lnRef>
+            <a:fillRef idx="1">
+              <a:schemeClr val="accent1"/>
+            </a:fillRef>
+            <a:effectRef idx="0">
+              <a:schemeClr val="accent1"/>
+            </a:effectRef>
+            <a:fontRef idx="minor">
+              <a:schemeClr val="lt1"/>
+            </a:fontRef>
+          </p:style>
+          <p:txBody>
+            <a:bodyPr rtlCol="0" anchor="ctr"/>
+            <a:lstStyle/>
+            <a:p>
+              <a:pPr marL="0" marR="0" lvl="0" indent="0" algn="ctr" defTabSz="914400" rtl="0" eaLnBrk="1" fontAlgn="auto" latinLnBrk="0" hangingPunct="1">
+                <a:lnSpc>
+                  <a:spcPct val="100000"/>
+                </a:lnSpc>
+                <a:spcBef>
+                  <a:spcPts val="0"/>
+                </a:spcBef>
+                <a:spcAft>
+                  <a:spcPts val="0"/>
+                </a:spcAft>
+                <a:buClrTx/>
+                <a:buSzTx/>
+                <a:buFontTx/>
+                <a:buNone/>
+                <a:tabLst/>
+                <a:defRPr/>
+              </a:pPr>
+              <a:endParaRPr kumimoji="0" lang="en-US" sz="1800" b="0" i="0" u="none" strike="noStrike" kern="1200" cap="none" spc="0" normalizeH="0" baseline="0" noProof="0">
+                <a:ln>
+                  <a:noFill/>
+                </a:ln>
+                <a:solidFill>
+                  <a:prstClr val="white"/>
+                </a:solidFill>
+                <a:effectLst/>
+                <a:uLnTx/>
+                <a:uFillTx/>
+                <a:latin typeface="Segoe UI"/>
+                <a:ea typeface="+mn-ea"/>
+                <a:cs typeface="+mn-cs"/>
+              </a:endParaRPr>
+            </a:p>
+          </p:txBody>
+        </p:sp>
+        <p:sp>
+          <p:nvSpPr>
+            <p:cNvPr id="68" name="TextBox 67">
+              <a:extLst>
+                <a:ext uri="{FF2B5EF4-FFF2-40B4-BE49-F238E27FC236}">
+                  <a16:creationId xmlns:a16="http://schemas.microsoft.com/office/drawing/2014/main" id="{A8C74598-9F07-4E12-8053-988D669D5292}"/>
+                </a:ext>
+              </a:extLst>
+            </p:cNvPr>
+            <p:cNvSpPr txBox="1"/>
+            <p:nvPr/>
+          </p:nvSpPr>
+          <p:spPr>
+            <a:xfrm>
+              <a:off x="1661583" y="5536107"/>
+              <a:ext cx="996097" cy="215444"/>
+            </a:xfrm>
+            <a:prstGeom prst="rect">
+              <a:avLst/>
+            </a:prstGeom>
+            <a:noFill/>
+          </p:spPr>
+          <p:txBody>
+            <a:bodyPr wrap="square" rtlCol="0">
+              <a:spAutoFit/>
+            </a:bodyPr>
+            <a:lstStyle/>
+            <a:p>
+              <a:pPr marL="0" marR="0" lvl="0" indent="0" algn="ctr" defTabSz="914400" rtl="0" eaLnBrk="1" fontAlgn="auto" latinLnBrk="0" hangingPunct="1">
+                <a:lnSpc>
+                  <a:spcPct val="100000"/>
+                </a:lnSpc>
+                <a:spcBef>
+                  <a:spcPts val="0"/>
+                </a:spcBef>
+                <a:spcAft>
+                  <a:spcPts val="0"/>
+                </a:spcAft>
+                <a:buClrTx/>
+                <a:buSzTx/>
+                <a:buFontTx/>
+                <a:buNone/>
+                <a:tabLst/>
+                <a:defRPr/>
+              </a:pPr>
+              <a:r>
+                <a:rPr kumimoji="0" lang="en-US" sz="800" b="0" i="0" u="none" strike="noStrike" kern="1200" cap="none" spc="0" normalizeH="0" baseline="0" noProof="0" dirty="0">
+                  <a:ln>
+                    <a:noFill/>
+                  </a:ln>
+                  <a:solidFill>
+                    <a:prstClr val="black"/>
+                  </a:solidFill>
+                  <a:effectLst/>
+                  <a:uLnTx/>
+                  <a:uFillTx/>
+                  <a:latin typeface="Segoe UI Semibold" panose="020B0702040204020203" pitchFamily="34" charset="0"/>
+                  <a:ea typeface="+mn-ea"/>
+                  <a:cs typeface="Segoe UI Semibold" panose="020B0702040204020203" pitchFamily="34" charset="0"/>
+                </a:rPr>
+                <a:t>Azure</a:t>
+              </a:r>
+            </a:p>
+          </p:txBody>
+        </p:sp>
+        <p:pic>
+          <p:nvPicPr>
+            <p:cNvPr id="69" name="Picture 68">
+              <a:extLst>
+                <a:ext uri="{FF2B5EF4-FFF2-40B4-BE49-F238E27FC236}">
+                  <a16:creationId xmlns:a16="http://schemas.microsoft.com/office/drawing/2014/main" id="{F37A3D06-7812-4B15-A0E6-0C201DD244AF}"/>
+                </a:ext>
+              </a:extLst>
+            </p:cNvPr>
+            <p:cNvPicPr>
+              <a:picLocks noChangeAspect="1"/>
+            </p:cNvPicPr>
+            <p:nvPr/>
+          </p:nvPicPr>
+          <p:blipFill>
+            <a:blip r:embed="rId5"/>
+            <a:stretch>
+              <a:fillRect/>
+            </a:stretch>
+          </p:blipFill>
+          <p:spPr>
+            <a:xfrm>
+              <a:off x="2178380" y="5241845"/>
+              <a:ext cx="258853" cy="280111"/>
+            </a:xfrm>
+            <a:prstGeom prst="rect">
+              <a:avLst/>
+            </a:prstGeom>
+          </p:spPr>
+        </p:pic>
+        <p:pic>
+          <p:nvPicPr>
+            <p:cNvPr id="70" name="Picture 69" descr="A picture containing drawing&#10;&#10;Description automatically generated">
+              <a:extLst>
+                <a:ext uri="{FF2B5EF4-FFF2-40B4-BE49-F238E27FC236}">
+                  <a16:creationId xmlns:a16="http://schemas.microsoft.com/office/drawing/2014/main" id="{58092FE3-D9D0-4E28-8F00-79265D32BB35}"/>
+                </a:ext>
+              </a:extLst>
+            </p:cNvPr>
+            <p:cNvPicPr>
+              <a:picLocks noChangeAspect="1"/>
+            </p:cNvPicPr>
+            <p:nvPr/>
+          </p:nvPicPr>
+          <p:blipFill>
+            <a:blip r:embed="rId6">
+              <a:extLst>
+                <a:ext uri="{28A0092B-C50C-407E-A947-70E740481C1C}">
+                  <a14:useLocalDpi xmlns:a14="http://schemas.microsoft.com/office/drawing/2010/main" val="0"/>
+                </a:ext>
+              </a:extLst>
+            </a:blip>
+            <a:stretch>
+              <a:fillRect/>
+            </a:stretch>
+          </p:blipFill>
+          <p:spPr>
+            <a:xfrm>
+              <a:off x="1842381" y="5250369"/>
+              <a:ext cx="244558" cy="244558"/>
+            </a:xfrm>
+            <a:prstGeom prst="rect">
+              <a:avLst/>
+            </a:prstGeom>
+          </p:spPr>
+        </p:pic>
+      </p:grpSp>
+      <p:grpSp>
+        <p:nvGrpSpPr>
+          <p:cNvPr id="71" name="Group 70">
+            <a:extLst>
+              <a:ext uri="{FF2B5EF4-FFF2-40B4-BE49-F238E27FC236}">
+                <a16:creationId xmlns:a16="http://schemas.microsoft.com/office/drawing/2014/main" id="{088B17BE-177A-438D-968E-F03294F901EA}"/>
+              </a:ext>
+            </a:extLst>
+          </p:cNvPr>
+          <p:cNvGrpSpPr/>
+          <p:nvPr/>
+        </p:nvGrpSpPr>
+        <p:grpSpPr>
+          <a:xfrm>
+            <a:off x="8889077" y="1072084"/>
+            <a:ext cx="996097" cy="604044"/>
+            <a:chOff x="1661583" y="5161658"/>
+            <a:chExt cx="996097" cy="604044"/>
+          </a:xfrm>
+        </p:grpSpPr>
+        <p:sp>
+          <p:nvSpPr>
+            <p:cNvPr id="72" name="Rectangle: Rounded Corners 71">
+              <a:extLst>
+                <a:ext uri="{FF2B5EF4-FFF2-40B4-BE49-F238E27FC236}">
+                  <a16:creationId xmlns:a16="http://schemas.microsoft.com/office/drawing/2014/main" id="{47A02EB6-2908-4BD4-8518-745FE3C73966}"/>
+                </a:ext>
+              </a:extLst>
+            </p:cNvPr>
+            <p:cNvSpPr/>
+            <p:nvPr/>
+          </p:nvSpPr>
+          <p:spPr>
+            <a:xfrm>
+              <a:off x="1699851" y="5161658"/>
+              <a:ext cx="919560" cy="604044"/>
+            </a:xfrm>
+            <a:prstGeom prst="roundRect">
+              <a:avLst/>
+            </a:prstGeom>
+            <a:noFill/>
+            <a:ln>
+              <a:solidFill>
+                <a:srgbClr val="0070C0"/>
+              </a:solidFill>
+              <a:prstDash val="sysDot"/>
+              <a:extLst>
+                <a:ext uri="{C807C97D-BFC1-408E-A445-0C87EB9F89A2}">
+                  <ask:lineSketchStyleProps xmlns:ask="http://schemas.microsoft.com/office/drawing/2018/sketchyshapes" sd="1219033472">
+                    <a:custGeom>
+                      <a:avLst/>
+                      <a:gdLst>
+                        <a:gd name="connsiteX0" fmla="*/ 0 w 1060525"/>
+                        <a:gd name="connsiteY0" fmla="*/ 158238 h 949411"/>
+                        <a:gd name="connsiteX1" fmla="*/ 158238 w 1060525"/>
+                        <a:gd name="connsiteY1" fmla="*/ 0 h 949411"/>
+                        <a:gd name="connsiteX2" fmla="*/ 545143 w 1060525"/>
+                        <a:gd name="connsiteY2" fmla="*/ 0 h 949411"/>
+                        <a:gd name="connsiteX3" fmla="*/ 902287 w 1060525"/>
+                        <a:gd name="connsiteY3" fmla="*/ 0 h 949411"/>
+                        <a:gd name="connsiteX4" fmla="*/ 1060525 w 1060525"/>
+                        <a:gd name="connsiteY4" fmla="*/ 158238 h 949411"/>
+                        <a:gd name="connsiteX5" fmla="*/ 1060525 w 1060525"/>
+                        <a:gd name="connsiteY5" fmla="*/ 462047 h 949411"/>
+                        <a:gd name="connsiteX6" fmla="*/ 1060525 w 1060525"/>
+                        <a:gd name="connsiteY6" fmla="*/ 791173 h 949411"/>
+                        <a:gd name="connsiteX7" fmla="*/ 902287 w 1060525"/>
+                        <a:gd name="connsiteY7" fmla="*/ 949411 h 949411"/>
+                        <a:gd name="connsiteX8" fmla="*/ 545143 w 1060525"/>
+                        <a:gd name="connsiteY8" fmla="*/ 949411 h 949411"/>
+                        <a:gd name="connsiteX9" fmla="*/ 158238 w 1060525"/>
+                        <a:gd name="connsiteY9" fmla="*/ 949411 h 949411"/>
+                        <a:gd name="connsiteX10" fmla="*/ 0 w 1060525"/>
+                        <a:gd name="connsiteY10" fmla="*/ 791173 h 949411"/>
+                        <a:gd name="connsiteX11" fmla="*/ 0 w 1060525"/>
+                        <a:gd name="connsiteY11" fmla="*/ 493694 h 949411"/>
+                        <a:gd name="connsiteX12" fmla="*/ 0 w 1060525"/>
+                        <a:gd name="connsiteY12" fmla="*/ 158238 h 949411"/>
+                      </a:gdLst>
+                      <a:ahLst/>
+                      <a:cxnLst>
+                        <a:cxn ang="0">
+                          <a:pos x="connsiteX0" y="connsiteY0"/>
+                        </a:cxn>
+                        <a:cxn ang="0">
+                          <a:pos x="connsiteX1" y="connsiteY1"/>
+                        </a:cxn>
+                        <a:cxn ang="0">
+                          <a:pos x="connsiteX2" y="connsiteY2"/>
+                        </a:cxn>
+                        <a:cxn ang="0">
+                          <a:pos x="connsiteX3" y="connsiteY3"/>
+                        </a:cxn>
+                        <a:cxn ang="0">
+                          <a:pos x="connsiteX4" y="connsiteY4"/>
+                        </a:cxn>
+                        <a:cxn ang="0">
+                          <a:pos x="connsiteX5" y="connsiteY5"/>
+                        </a:cxn>
+                        <a:cxn ang="0">
+                          <a:pos x="connsiteX6" y="connsiteY6"/>
+                        </a:cxn>
+                        <a:cxn ang="0">
+                          <a:pos x="connsiteX7" y="connsiteY7"/>
+                        </a:cxn>
+                        <a:cxn ang="0">
+                          <a:pos x="connsiteX8" y="connsiteY8"/>
+                        </a:cxn>
+                        <a:cxn ang="0">
+                          <a:pos x="connsiteX9" y="connsiteY9"/>
+                        </a:cxn>
+                        <a:cxn ang="0">
+                          <a:pos x="connsiteX10" y="connsiteY10"/>
+                        </a:cxn>
+                        <a:cxn ang="0">
+                          <a:pos x="connsiteX11" y="connsiteY11"/>
+                        </a:cxn>
+                        <a:cxn ang="0">
+                          <a:pos x="connsiteX12" y="connsiteY12"/>
+                        </a:cxn>
+                      </a:cxnLst>
+                      <a:rect l="l" t="t" r="r" b="b"/>
+                      <a:pathLst>
+                        <a:path w="1060525" h="949411" extrusionOk="0">
+                          <a:moveTo>
+                            <a:pt x="0" y="158238"/>
+                          </a:moveTo>
+                          <a:cubicBezTo>
+                            <a:pt x="-6968" y="66548"/>
+                            <a:pt x="48378" y="8433"/>
+                            <a:pt x="158238" y="0"/>
+                          </a:cubicBezTo>
+                          <a:cubicBezTo>
+                            <a:pt x="349666" y="-16998"/>
+                            <a:pt x="425630" y="45732"/>
+                            <a:pt x="545143" y="0"/>
+                          </a:cubicBezTo>
+                          <a:cubicBezTo>
+                            <a:pt x="664657" y="-45732"/>
+                            <a:pt x="820159" y="12596"/>
+                            <a:pt x="902287" y="0"/>
+                          </a:cubicBezTo>
+                          <a:cubicBezTo>
+                            <a:pt x="971578" y="-9904"/>
+                            <a:pt x="1073159" y="76883"/>
+                            <a:pt x="1060525" y="158238"/>
+                          </a:cubicBezTo>
+                          <a:cubicBezTo>
+                            <a:pt x="1070157" y="289612"/>
+                            <a:pt x="1042806" y="329690"/>
+                            <a:pt x="1060525" y="462047"/>
+                          </a:cubicBezTo>
+                          <a:cubicBezTo>
+                            <a:pt x="1078244" y="594404"/>
+                            <a:pt x="1038376" y="643113"/>
+                            <a:pt x="1060525" y="791173"/>
+                          </a:cubicBezTo>
+                          <a:cubicBezTo>
+                            <a:pt x="1059057" y="864564"/>
+                            <a:pt x="981426" y="960880"/>
+                            <a:pt x="902287" y="949411"/>
+                          </a:cubicBezTo>
+                          <a:cubicBezTo>
+                            <a:pt x="753690" y="960561"/>
+                            <a:pt x="631505" y="915417"/>
+                            <a:pt x="545143" y="949411"/>
+                          </a:cubicBezTo>
+                          <a:cubicBezTo>
+                            <a:pt x="458781" y="983405"/>
+                            <a:pt x="339279" y="911965"/>
+                            <a:pt x="158238" y="949411"/>
+                          </a:cubicBezTo>
+                          <a:cubicBezTo>
+                            <a:pt x="73589" y="953494"/>
+                            <a:pt x="1058" y="889527"/>
+                            <a:pt x="0" y="791173"/>
+                          </a:cubicBezTo>
+                          <a:cubicBezTo>
+                            <a:pt x="-31957" y="731446"/>
+                            <a:pt x="21377" y="595516"/>
+                            <a:pt x="0" y="493694"/>
+                          </a:cubicBezTo>
+                          <a:cubicBezTo>
+                            <a:pt x="-21377" y="391872"/>
+                            <a:pt x="35644" y="296102"/>
+                            <a:pt x="0" y="158238"/>
+                          </a:cubicBezTo>
+                          <a:close/>
+                        </a:path>
+                      </a:pathLst>
+                    </a:custGeom>
+                    <ask:type>
+                      <ask:lineSketchNone/>
+                    </ask:type>
+                  </ask:lineSketchStyleProps>
+                </a:ext>
+              </a:extLst>
+            </a:ln>
+          </p:spPr>
+          <p:style>
+            <a:lnRef idx="2">
+              <a:schemeClr val="accent1">
+                <a:shade val="50000"/>
+              </a:schemeClr>
+            </a:lnRef>
+            <a:fillRef idx="1">
+              <a:schemeClr val="accent1"/>
+            </a:fillRef>
+            <a:effectRef idx="0">
+              <a:schemeClr val="accent1"/>
+            </a:effectRef>
+            <a:fontRef idx="minor">
+              <a:schemeClr val="lt1"/>
+            </a:fontRef>
+          </p:style>
+          <p:txBody>
+            <a:bodyPr rtlCol="0" anchor="ctr"/>
+            <a:lstStyle/>
+            <a:p>
+              <a:pPr marL="0" marR="0" lvl="0" indent="0" algn="ctr" defTabSz="914400" rtl="0" eaLnBrk="1" fontAlgn="auto" latinLnBrk="0" hangingPunct="1">
+                <a:lnSpc>
+                  <a:spcPct val="100000"/>
+                </a:lnSpc>
+                <a:spcBef>
+                  <a:spcPts val="0"/>
+                </a:spcBef>
+                <a:spcAft>
+                  <a:spcPts val="0"/>
+                </a:spcAft>
+                <a:buClrTx/>
+                <a:buSzTx/>
+                <a:buFontTx/>
+                <a:buNone/>
+                <a:tabLst/>
+                <a:defRPr/>
+              </a:pPr>
+              <a:endParaRPr kumimoji="0" lang="en-US" sz="1800" b="0" i="0" u="none" strike="noStrike" kern="1200" cap="none" spc="0" normalizeH="0" baseline="0" noProof="0">
+                <a:ln>
+                  <a:noFill/>
+                </a:ln>
+                <a:solidFill>
+                  <a:prstClr val="white"/>
+                </a:solidFill>
+                <a:effectLst/>
+                <a:uLnTx/>
+                <a:uFillTx/>
+                <a:latin typeface="Segoe UI"/>
+                <a:ea typeface="+mn-ea"/>
+                <a:cs typeface="+mn-cs"/>
+              </a:endParaRPr>
+            </a:p>
+          </p:txBody>
+        </p:sp>
+        <p:sp>
+          <p:nvSpPr>
+            <p:cNvPr id="73" name="TextBox 72">
+              <a:extLst>
+                <a:ext uri="{FF2B5EF4-FFF2-40B4-BE49-F238E27FC236}">
+                  <a16:creationId xmlns:a16="http://schemas.microsoft.com/office/drawing/2014/main" id="{99524C5A-EB01-4810-BB1A-99ABC324D5F2}"/>
+                </a:ext>
+              </a:extLst>
+            </p:cNvPr>
+            <p:cNvSpPr txBox="1"/>
+            <p:nvPr/>
+          </p:nvSpPr>
+          <p:spPr>
+            <a:xfrm>
+              <a:off x="1661583" y="5536107"/>
+              <a:ext cx="996097" cy="215444"/>
+            </a:xfrm>
+            <a:prstGeom prst="rect">
+              <a:avLst/>
+            </a:prstGeom>
+            <a:noFill/>
+          </p:spPr>
+          <p:txBody>
+            <a:bodyPr wrap="square" rtlCol="0">
+              <a:spAutoFit/>
+            </a:bodyPr>
+            <a:lstStyle/>
+            <a:p>
+              <a:pPr marL="0" marR="0" lvl="0" indent="0" algn="ctr" defTabSz="914400" rtl="0" eaLnBrk="1" fontAlgn="auto" latinLnBrk="0" hangingPunct="1">
+                <a:lnSpc>
+                  <a:spcPct val="100000"/>
+                </a:lnSpc>
+                <a:spcBef>
+                  <a:spcPts val="0"/>
+                </a:spcBef>
+                <a:spcAft>
+                  <a:spcPts val="0"/>
+                </a:spcAft>
+                <a:buClrTx/>
+                <a:buSzTx/>
+                <a:buFontTx/>
+                <a:buNone/>
+                <a:tabLst/>
+                <a:defRPr/>
+              </a:pPr>
+              <a:r>
+                <a:rPr kumimoji="0" lang="en-US" sz="800" b="0" i="0" u="none" strike="noStrike" kern="1200" cap="none" spc="0" normalizeH="0" baseline="0" noProof="0" dirty="0">
+                  <a:ln>
+                    <a:noFill/>
+                  </a:ln>
+                  <a:solidFill>
+                    <a:prstClr val="black"/>
+                  </a:solidFill>
+                  <a:effectLst/>
+                  <a:uLnTx/>
+                  <a:uFillTx/>
+                  <a:latin typeface="Segoe UI Semibold" panose="020B0702040204020203" pitchFamily="34" charset="0"/>
+                  <a:ea typeface="+mn-ea"/>
+                  <a:cs typeface="Segoe UI Semibold" panose="020B0702040204020203" pitchFamily="34" charset="0"/>
+                </a:rPr>
+                <a:t>Azure</a:t>
+              </a:r>
+            </a:p>
+          </p:txBody>
+        </p:sp>
+        <p:pic>
+          <p:nvPicPr>
+            <p:cNvPr id="74" name="Picture 73">
+              <a:extLst>
+                <a:ext uri="{FF2B5EF4-FFF2-40B4-BE49-F238E27FC236}">
+                  <a16:creationId xmlns:a16="http://schemas.microsoft.com/office/drawing/2014/main" id="{564431A8-00DB-4905-8C5D-55ED927BF0A8}"/>
+                </a:ext>
+              </a:extLst>
+            </p:cNvPr>
+            <p:cNvPicPr>
+              <a:picLocks noChangeAspect="1"/>
+            </p:cNvPicPr>
+            <p:nvPr/>
+          </p:nvPicPr>
+          <p:blipFill>
+            <a:blip r:embed="rId5"/>
+            <a:stretch>
+              <a:fillRect/>
+            </a:stretch>
+          </p:blipFill>
+          <p:spPr>
+            <a:xfrm>
+              <a:off x="2178380" y="5241845"/>
+              <a:ext cx="258853" cy="280111"/>
+            </a:xfrm>
+            <a:prstGeom prst="rect">
+              <a:avLst/>
+            </a:prstGeom>
+          </p:spPr>
+        </p:pic>
+        <p:pic>
+          <p:nvPicPr>
+            <p:cNvPr id="75" name="Picture 74" descr="A picture containing drawing&#10;&#10;Description automatically generated">
+              <a:extLst>
+                <a:ext uri="{FF2B5EF4-FFF2-40B4-BE49-F238E27FC236}">
+                  <a16:creationId xmlns:a16="http://schemas.microsoft.com/office/drawing/2014/main" id="{A19E2810-616B-4A3D-835A-38954DE5C202}"/>
+                </a:ext>
+              </a:extLst>
+            </p:cNvPr>
+            <p:cNvPicPr>
+              <a:picLocks noChangeAspect="1"/>
+            </p:cNvPicPr>
+            <p:nvPr/>
+          </p:nvPicPr>
+          <p:blipFill>
+            <a:blip r:embed="rId6">
+              <a:extLst>
+                <a:ext uri="{28A0092B-C50C-407E-A947-70E740481C1C}">
+                  <a14:useLocalDpi xmlns:a14="http://schemas.microsoft.com/office/drawing/2010/main" val="0"/>
+                </a:ext>
+              </a:extLst>
+            </a:blip>
+            <a:stretch>
+              <a:fillRect/>
+            </a:stretch>
+          </p:blipFill>
+          <p:spPr>
+            <a:xfrm>
+              <a:off x="1842381" y="5250369"/>
+              <a:ext cx="244558" cy="244558"/>
+            </a:xfrm>
+            <a:prstGeom prst="rect">
+              <a:avLst/>
+            </a:prstGeom>
+          </p:spPr>
+        </p:pic>
+      </p:grpSp>
+      <p:grpSp>
+        <p:nvGrpSpPr>
+          <p:cNvPr id="76" name="Group 75">
+            <a:extLst>
+              <a:ext uri="{FF2B5EF4-FFF2-40B4-BE49-F238E27FC236}">
+                <a16:creationId xmlns:a16="http://schemas.microsoft.com/office/drawing/2014/main" id="{7B8E0FF1-F1E5-4AD6-8461-20EC62EF4D4B}"/>
+              </a:ext>
+            </a:extLst>
+          </p:cNvPr>
+          <p:cNvGrpSpPr/>
+          <p:nvPr/>
+        </p:nvGrpSpPr>
+        <p:grpSpPr>
+          <a:xfrm>
+            <a:off x="1232982" y="1072084"/>
+            <a:ext cx="996097" cy="604044"/>
+            <a:chOff x="1661583" y="5161658"/>
+            <a:chExt cx="996097" cy="604044"/>
+          </a:xfrm>
+        </p:grpSpPr>
+        <p:sp>
+          <p:nvSpPr>
+            <p:cNvPr id="77" name="Rectangle: Rounded Corners 76">
+              <a:extLst>
+                <a:ext uri="{FF2B5EF4-FFF2-40B4-BE49-F238E27FC236}">
+                  <a16:creationId xmlns:a16="http://schemas.microsoft.com/office/drawing/2014/main" id="{A036A29D-C69D-4AAF-9698-FC8A80F9A110}"/>
+                </a:ext>
+              </a:extLst>
+            </p:cNvPr>
+            <p:cNvSpPr/>
+            <p:nvPr/>
+          </p:nvSpPr>
+          <p:spPr>
+            <a:xfrm>
+              <a:off x="1699851" y="5161658"/>
+              <a:ext cx="919560" cy="604044"/>
+            </a:xfrm>
+            <a:prstGeom prst="roundRect">
+              <a:avLst/>
+            </a:prstGeom>
+            <a:noFill/>
+            <a:ln>
+              <a:solidFill>
+                <a:srgbClr val="0070C0"/>
+              </a:solidFill>
+              <a:prstDash val="sysDot"/>
+              <a:extLst>
+                <a:ext uri="{C807C97D-BFC1-408E-A445-0C87EB9F89A2}">
+                  <ask:lineSketchStyleProps xmlns:ask="http://schemas.microsoft.com/office/drawing/2018/sketchyshapes" sd="1219033472">
+                    <a:custGeom>
+                      <a:avLst/>
+                      <a:gdLst>
+                        <a:gd name="connsiteX0" fmla="*/ 0 w 1060525"/>
+                        <a:gd name="connsiteY0" fmla="*/ 158238 h 949411"/>
+                        <a:gd name="connsiteX1" fmla="*/ 158238 w 1060525"/>
+                        <a:gd name="connsiteY1" fmla="*/ 0 h 949411"/>
+                        <a:gd name="connsiteX2" fmla="*/ 545143 w 1060525"/>
+                        <a:gd name="connsiteY2" fmla="*/ 0 h 949411"/>
+                        <a:gd name="connsiteX3" fmla="*/ 902287 w 1060525"/>
+                        <a:gd name="connsiteY3" fmla="*/ 0 h 949411"/>
+                        <a:gd name="connsiteX4" fmla="*/ 1060525 w 1060525"/>
+                        <a:gd name="connsiteY4" fmla="*/ 158238 h 949411"/>
+                        <a:gd name="connsiteX5" fmla="*/ 1060525 w 1060525"/>
+                        <a:gd name="connsiteY5" fmla="*/ 462047 h 949411"/>
+                        <a:gd name="connsiteX6" fmla="*/ 1060525 w 1060525"/>
+                        <a:gd name="connsiteY6" fmla="*/ 791173 h 949411"/>
+                        <a:gd name="connsiteX7" fmla="*/ 902287 w 1060525"/>
+                        <a:gd name="connsiteY7" fmla="*/ 949411 h 949411"/>
+                        <a:gd name="connsiteX8" fmla="*/ 545143 w 1060525"/>
+                        <a:gd name="connsiteY8" fmla="*/ 949411 h 949411"/>
+                        <a:gd name="connsiteX9" fmla="*/ 158238 w 1060525"/>
+                        <a:gd name="connsiteY9" fmla="*/ 949411 h 949411"/>
+                        <a:gd name="connsiteX10" fmla="*/ 0 w 1060525"/>
+                        <a:gd name="connsiteY10" fmla="*/ 791173 h 949411"/>
+                        <a:gd name="connsiteX11" fmla="*/ 0 w 1060525"/>
+                        <a:gd name="connsiteY11" fmla="*/ 493694 h 949411"/>
+                        <a:gd name="connsiteX12" fmla="*/ 0 w 1060525"/>
+                        <a:gd name="connsiteY12" fmla="*/ 158238 h 949411"/>
+                      </a:gdLst>
+                      <a:ahLst/>
+                      <a:cxnLst>
+                        <a:cxn ang="0">
+                          <a:pos x="connsiteX0" y="connsiteY0"/>
+                        </a:cxn>
+                        <a:cxn ang="0">
+                          <a:pos x="connsiteX1" y="connsiteY1"/>
+                        </a:cxn>
+                        <a:cxn ang="0">
+                          <a:pos x="connsiteX2" y="connsiteY2"/>
+                        </a:cxn>
+                        <a:cxn ang="0">
+                          <a:pos x="connsiteX3" y="connsiteY3"/>
+                        </a:cxn>
+                        <a:cxn ang="0">
+                          <a:pos x="connsiteX4" y="connsiteY4"/>
+                        </a:cxn>
+                        <a:cxn ang="0">
+                          <a:pos x="connsiteX5" y="connsiteY5"/>
+                        </a:cxn>
+                        <a:cxn ang="0">
+                          <a:pos x="connsiteX6" y="connsiteY6"/>
+                        </a:cxn>
+                        <a:cxn ang="0">
+                          <a:pos x="connsiteX7" y="connsiteY7"/>
+                        </a:cxn>
+                        <a:cxn ang="0">
+                          <a:pos x="connsiteX8" y="connsiteY8"/>
+                        </a:cxn>
+                        <a:cxn ang="0">
+                          <a:pos x="connsiteX9" y="connsiteY9"/>
+                        </a:cxn>
+                        <a:cxn ang="0">
+                          <a:pos x="connsiteX10" y="connsiteY10"/>
+                        </a:cxn>
+                        <a:cxn ang="0">
+                          <a:pos x="connsiteX11" y="connsiteY11"/>
+                        </a:cxn>
+                        <a:cxn ang="0">
+                          <a:pos x="connsiteX12" y="connsiteY12"/>
+                        </a:cxn>
+                      </a:cxnLst>
+                      <a:rect l="l" t="t" r="r" b="b"/>
+                      <a:pathLst>
+                        <a:path w="1060525" h="949411" extrusionOk="0">
+                          <a:moveTo>
+                            <a:pt x="0" y="158238"/>
+                          </a:moveTo>
+                          <a:cubicBezTo>
+                            <a:pt x="-6968" y="66548"/>
+                            <a:pt x="48378" y="8433"/>
+                            <a:pt x="158238" y="0"/>
+                          </a:cubicBezTo>
+                          <a:cubicBezTo>
+                            <a:pt x="349666" y="-16998"/>
+                            <a:pt x="425630" y="45732"/>
+                            <a:pt x="545143" y="0"/>
+                          </a:cubicBezTo>
+                          <a:cubicBezTo>
+                            <a:pt x="664657" y="-45732"/>
+                            <a:pt x="820159" y="12596"/>
+                            <a:pt x="902287" y="0"/>
+                          </a:cubicBezTo>
+                          <a:cubicBezTo>
+                            <a:pt x="971578" y="-9904"/>
+                            <a:pt x="1073159" y="76883"/>
+                            <a:pt x="1060525" y="158238"/>
+                          </a:cubicBezTo>
+                          <a:cubicBezTo>
+                            <a:pt x="1070157" y="289612"/>
+                            <a:pt x="1042806" y="329690"/>
+                            <a:pt x="1060525" y="462047"/>
+                          </a:cubicBezTo>
+                          <a:cubicBezTo>
+                            <a:pt x="1078244" y="594404"/>
+                            <a:pt x="1038376" y="643113"/>
+                            <a:pt x="1060525" y="791173"/>
+                          </a:cubicBezTo>
+                          <a:cubicBezTo>
+                            <a:pt x="1059057" y="864564"/>
+                            <a:pt x="981426" y="960880"/>
+                            <a:pt x="902287" y="949411"/>
+                          </a:cubicBezTo>
+                          <a:cubicBezTo>
+                            <a:pt x="753690" y="960561"/>
+                            <a:pt x="631505" y="915417"/>
+                            <a:pt x="545143" y="949411"/>
+                          </a:cubicBezTo>
+                          <a:cubicBezTo>
+                            <a:pt x="458781" y="983405"/>
+                            <a:pt x="339279" y="911965"/>
+                            <a:pt x="158238" y="949411"/>
+                          </a:cubicBezTo>
+                          <a:cubicBezTo>
+                            <a:pt x="73589" y="953494"/>
+                            <a:pt x="1058" y="889527"/>
+                            <a:pt x="0" y="791173"/>
+                          </a:cubicBezTo>
+                          <a:cubicBezTo>
+                            <a:pt x="-31957" y="731446"/>
+                            <a:pt x="21377" y="595516"/>
+                            <a:pt x="0" y="493694"/>
+                          </a:cubicBezTo>
+                          <a:cubicBezTo>
+                            <a:pt x="-21377" y="391872"/>
+                            <a:pt x="35644" y="296102"/>
+                            <a:pt x="0" y="158238"/>
+                          </a:cubicBezTo>
+                          <a:close/>
+                        </a:path>
+                      </a:pathLst>
+                    </a:custGeom>
+                    <ask:type>
+                      <ask:lineSketchNone/>
+                    </ask:type>
+                  </ask:lineSketchStyleProps>
+                </a:ext>
+              </a:extLst>
+            </a:ln>
+          </p:spPr>
+          <p:style>
+            <a:lnRef idx="2">
+              <a:schemeClr val="accent1">
+                <a:shade val="50000"/>
+              </a:schemeClr>
+            </a:lnRef>
+            <a:fillRef idx="1">
+              <a:schemeClr val="accent1"/>
+            </a:fillRef>
+            <a:effectRef idx="0">
+              <a:schemeClr val="accent1"/>
+            </a:effectRef>
+            <a:fontRef idx="minor">
+              <a:schemeClr val="lt1"/>
+            </a:fontRef>
+          </p:style>
+          <p:txBody>
+            <a:bodyPr rtlCol="0" anchor="ctr"/>
+            <a:lstStyle/>
+            <a:p>
+              <a:pPr marL="0" marR="0" lvl="0" indent="0" algn="ctr" defTabSz="914400" rtl="0" eaLnBrk="1" fontAlgn="auto" latinLnBrk="0" hangingPunct="1">
+                <a:lnSpc>
+                  <a:spcPct val="100000"/>
+                </a:lnSpc>
+                <a:spcBef>
+                  <a:spcPts val="0"/>
+                </a:spcBef>
+                <a:spcAft>
+                  <a:spcPts val="0"/>
+                </a:spcAft>
+                <a:buClrTx/>
+                <a:buSzTx/>
+                <a:buFontTx/>
+                <a:buNone/>
+                <a:tabLst/>
+                <a:defRPr/>
+              </a:pPr>
+              <a:endParaRPr kumimoji="0" lang="en-US" sz="1800" b="0" i="0" u="none" strike="noStrike" kern="1200" cap="none" spc="0" normalizeH="0" baseline="0" noProof="0">
+                <a:ln>
+                  <a:noFill/>
+                </a:ln>
+                <a:solidFill>
+                  <a:prstClr val="white"/>
+                </a:solidFill>
+                <a:effectLst/>
+                <a:uLnTx/>
+                <a:uFillTx/>
+                <a:latin typeface="Segoe UI"/>
+                <a:ea typeface="+mn-ea"/>
+                <a:cs typeface="+mn-cs"/>
+              </a:endParaRPr>
+            </a:p>
+          </p:txBody>
+        </p:sp>
+        <p:sp>
+          <p:nvSpPr>
+            <p:cNvPr id="78" name="TextBox 77">
+              <a:extLst>
+                <a:ext uri="{FF2B5EF4-FFF2-40B4-BE49-F238E27FC236}">
+                  <a16:creationId xmlns:a16="http://schemas.microsoft.com/office/drawing/2014/main" id="{0C88F7D7-30F5-477C-A761-EC3915DBEABC}"/>
+                </a:ext>
+              </a:extLst>
+            </p:cNvPr>
+            <p:cNvSpPr txBox="1"/>
+            <p:nvPr/>
+          </p:nvSpPr>
+          <p:spPr>
+            <a:xfrm>
+              <a:off x="1661583" y="5536107"/>
+              <a:ext cx="996097" cy="215444"/>
+            </a:xfrm>
+            <a:prstGeom prst="rect">
+              <a:avLst/>
+            </a:prstGeom>
+            <a:noFill/>
+          </p:spPr>
+          <p:txBody>
+            <a:bodyPr wrap="square" rtlCol="0">
+              <a:spAutoFit/>
+            </a:bodyPr>
+            <a:lstStyle/>
+            <a:p>
+              <a:pPr marL="0" marR="0" lvl="0" indent="0" algn="ctr" defTabSz="914400" rtl="0" eaLnBrk="1" fontAlgn="auto" latinLnBrk="0" hangingPunct="1">
+                <a:lnSpc>
+                  <a:spcPct val="100000"/>
+                </a:lnSpc>
+                <a:spcBef>
+                  <a:spcPts val="0"/>
+                </a:spcBef>
+                <a:spcAft>
+                  <a:spcPts val="0"/>
+                </a:spcAft>
+                <a:buClrTx/>
+                <a:buSzTx/>
+                <a:buFontTx/>
+                <a:buNone/>
+                <a:tabLst/>
+                <a:defRPr/>
+              </a:pPr>
+              <a:r>
+                <a:rPr kumimoji="0" lang="en-US" sz="800" b="0" i="0" u="none" strike="noStrike" kern="1200" cap="none" spc="0" normalizeH="0" baseline="0" noProof="0" dirty="0">
+                  <a:ln>
+                    <a:noFill/>
+                  </a:ln>
+                  <a:solidFill>
+                    <a:prstClr val="black"/>
+                  </a:solidFill>
+                  <a:effectLst/>
+                  <a:uLnTx/>
+                  <a:uFillTx/>
+                  <a:latin typeface="Segoe UI Semibold" panose="020B0702040204020203" pitchFamily="34" charset="0"/>
+                  <a:ea typeface="+mn-ea"/>
+                  <a:cs typeface="Segoe UI Semibold" panose="020B0702040204020203" pitchFamily="34" charset="0"/>
+                </a:rPr>
+                <a:t>Azure</a:t>
+              </a:r>
+            </a:p>
+          </p:txBody>
+        </p:sp>
+        <p:pic>
+          <p:nvPicPr>
+            <p:cNvPr id="79" name="Picture 78">
+              <a:extLst>
+                <a:ext uri="{FF2B5EF4-FFF2-40B4-BE49-F238E27FC236}">
+                  <a16:creationId xmlns:a16="http://schemas.microsoft.com/office/drawing/2014/main" id="{50F7B42E-C5C4-4776-91F3-6C231595E194}"/>
+                </a:ext>
+              </a:extLst>
+            </p:cNvPr>
+            <p:cNvPicPr>
+              <a:picLocks noChangeAspect="1"/>
+            </p:cNvPicPr>
+            <p:nvPr/>
+          </p:nvPicPr>
+          <p:blipFill>
+            <a:blip r:embed="rId5"/>
+            <a:stretch>
+              <a:fillRect/>
+            </a:stretch>
+          </p:blipFill>
+          <p:spPr>
+            <a:xfrm>
+              <a:off x="2030205" y="5241845"/>
+              <a:ext cx="258853" cy="280111"/>
+            </a:xfrm>
+            <a:prstGeom prst="rect">
+              <a:avLst/>
+            </a:prstGeom>
+          </p:spPr>
+        </p:pic>
+      </p:grpSp>
     </p:spTree>
     <p:extLst>
       <p:ext uri="{BB962C8B-B14F-4D97-AF65-F5344CB8AC3E}">
@@ -9542,7 +10898,7 @@
 </file>
 
 <file path=ppt/slides/slide3.xml><?xml version="1.0" encoding="utf-8"?>
-<p:sld xmlns:a="http://schemas.openxmlformats.org/drawingml/2006/main" xmlns:r="http://schemas.openxmlformats.org/officeDocument/2006/relationships" xmlns:p="http://schemas.openxmlformats.org/presentationml/2006/main">
+<p:sld xmlns:a="http://schemas.openxmlformats.org/drawingml/2006/main" xmlns:r="http://schemas.openxmlformats.org/officeDocument/2006/relationships" xmlns:p="http://schemas.openxmlformats.org/presentationml/2006/main" show="0">
   <p:cSld>
     <p:spTree>
       <p:nvGrpSpPr>
@@ -9986,7 +11342,7 @@
 </file>
 
 <file path=ppt/slides/slide4.xml><?xml version="1.0" encoding="utf-8"?>
-<p:sld xmlns:a="http://schemas.openxmlformats.org/drawingml/2006/main" xmlns:r="http://schemas.openxmlformats.org/officeDocument/2006/relationships" xmlns:p="http://schemas.openxmlformats.org/presentationml/2006/main">
+<p:sld xmlns:a="http://schemas.openxmlformats.org/drawingml/2006/main" xmlns:r="http://schemas.openxmlformats.org/officeDocument/2006/relationships" xmlns:p="http://schemas.openxmlformats.org/presentationml/2006/main" show="0">
   <p:cSld>
     <p:spTree>
       <p:nvGrpSpPr>
@@ -11031,16 +12387,6 @@
 </file>
 
 <file path=customXml/item1.xml><?xml version="1.0" encoding="utf-8"?>
-<p:properties xmlns:p="http://schemas.microsoft.com/office/2006/metadata/properties" xmlns:xsi="http://www.w3.org/2001/XMLSchema-instance" xmlns:pc="http://schemas.microsoft.com/office/infopath/2007/PartnerControls">
-  <documentManagement>
-    <_ip_UnifiedCompliancePolicyUIAction xmlns="http://schemas.microsoft.com/sharepoint/v3" xsi:nil="true"/>
-    <_STS_x0020_Hashtags xmlns="912cb619-99d2-4794-acea-8354d3da3f58"/>
-    <_ip_UnifiedCompliancePolicyProperties xmlns="http://schemas.microsoft.com/sharepoint/v3" xsi:nil="true"/>
-  </documentManagement>
-</p:properties>
-</file>
-
-<file path=customXml/item2.xml><?xml version="1.0" encoding="utf-8"?>
 <ct:contentTypeSchema xmlns:ct="http://schemas.microsoft.com/office/2006/metadata/contentType" xmlns:ma="http://schemas.microsoft.com/office/2006/metadata/properties/metaAttributes" ct:_="" ma:_="" ma:contentTypeName="Document" ma:contentTypeID="0x010100E91BF5703B036B41A0430F443AD95DB8" ma:contentTypeVersion="19" ma:contentTypeDescription="Create a new document." ma:contentTypeScope="" ma:versionID="ffaa6361bbca0f44b1c0ce4466c0db6d">
   <xsd:schema xmlns:xsd="http://www.w3.org/2001/XMLSchema" xmlns:xs="http://www.w3.org/2001/XMLSchema" xmlns:p="http://schemas.microsoft.com/office/2006/metadata/properties" xmlns:ns1="http://schemas.microsoft.com/sharepoint/v3" xmlns:ns3="d02dc944-d877-4fdc-84c6-4fb412a3c730" xmlns:ns4="912cb619-99d2-4794-acea-8354d3da3f58" targetNamespace="http://schemas.microsoft.com/office/2006/metadata/properties" ma:root="true" ma:fieldsID="b40e0413ab5e745cbe4ceab969b882de" ns1:_="" ns3:_="" ns4:_="">
     <xsd:import namespace="http://schemas.microsoft.com/sharepoint/v3"/>
@@ -11314,6 +12660,16 @@
 </ct:contentTypeSchema>
 </file>
 
+<file path=customXml/item2.xml><?xml version="1.0" encoding="utf-8"?>
+<p:properties xmlns:p="http://schemas.microsoft.com/office/2006/metadata/properties" xmlns:xsi="http://www.w3.org/2001/XMLSchema-instance" xmlns:pc="http://schemas.microsoft.com/office/infopath/2007/PartnerControls">
+  <documentManagement>
+    <_ip_UnifiedCompliancePolicyUIAction xmlns="http://schemas.microsoft.com/sharepoint/v3" xsi:nil="true"/>
+    <_STS_x0020_Hashtags xmlns="912cb619-99d2-4794-acea-8354d3da3f58"/>
+    <_ip_UnifiedCompliancePolicyProperties xmlns="http://schemas.microsoft.com/sharepoint/v3" xsi:nil="true"/>
+  </documentManagement>
+</p:properties>
+</file>
+
 <file path=customXml/item3.xml><?xml version="1.0" encoding="utf-8"?>
 <?mso-contentType ?>
 <FormTemplates xmlns="http://schemas.microsoft.com/sharepoint/v3/contenttype/forms">
@@ -11324,24 +12680,6 @@
 </file>
 
 <file path=customXml/itemProps1.xml><?xml version="1.0" encoding="utf-8"?>
-<ds:datastoreItem xmlns:ds="http://schemas.openxmlformats.org/officeDocument/2006/customXml" ds:itemID="{3C5C0833-7061-4150-BC56-068CBF255117}">
-  <ds:schemaRefs>
-    <ds:schemaRef ds:uri="d02dc944-d877-4fdc-84c6-4fb412a3c730"/>
-    <ds:schemaRef ds:uri="http://www.w3.org/XML/1998/namespace"/>
-    <ds:schemaRef ds:uri="http://purl.org/dc/dcmitype/"/>
-    <ds:schemaRef ds:uri="http://schemas.microsoft.com/sharepoint/v3"/>
-    <ds:schemaRef ds:uri="http://schemas.microsoft.com/office/2006/documentManagement/types"/>
-    <ds:schemaRef ds:uri="http://schemas.openxmlformats.org/package/2006/metadata/core-properties"/>
-    <ds:schemaRef ds:uri="http://purl.org/dc/terms/"/>
-    <ds:schemaRef ds:uri="http://schemas.microsoft.com/office/infopath/2007/PartnerControls"/>
-    <ds:schemaRef ds:uri="912cb619-99d2-4794-acea-8354d3da3f58"/>
-    <ds:schemaRef ds:uri="http://schemas.microsoft.com/office/2006/metadata/properties"/>
-    <ds:schemaRef ds:uri="http://purl.org/dc/elements/1.1/"/>
-  </ds:schemaRefs>
-</ds:datastoreItem>
-</file>
-
-<file path=customXml/itemProps2.xml><?xml version="1.0" encoding="utf-8"?>
 <ds:datastoreItem xmlns:ds="http://schemas.openxmlformats.org/officeDocument/2006/customXml" ds:itemID="{F1D7A875-EC20-4E52-AF72-101135F1265B}">
   <ds:schemaRefs>
     <ds:schemaRef ds:uri="http://schemas.microsoft.com/office/2006/metadata/contentType"/>
@@ -11361,6 +12699,24 @@
 </ds:datastoreItem>
 </file>
 
+<file path=customXml/itemProps2.xml><?xml version="1.0" encoding="utf-8"?>
+<ds:datastoreItem xmlns:ds="http://schemas.openxmlformats.org/officeDocument/2006/customXml" ds:itemID="{3C5C0833-7061-4150-BC56-068CBF255117}">
+  <ds:schemaRefs>
+    <ds:schemaRef ds:uri="d02dc944-d877-4fdc-84c6-4fb412a3c730"/>
+    <ds:schemaRef ds:uri="http://www.w3.org/XML/1998/namespace"/>
+    <ds:schemaRef ds:uri="http://purl.org/dc/dcmitype/"/>
+    <ds:schemaRef ds:uri="http://schemas.microsoft.com/sharepoint/v3"/>
+    <ds:schemaRef ds:uri="http://schemas.microsoft.com/office/2006/documentManagement/types"/>
+    <ds:schemaRef ds:uri="http://schemas.openxmlformats.org/package/2006/metadata/core-properties"/>
+    <ds:schemaRef ds:uri="http://purl.org/dc/terms/"/>
+    <ds:schemaRef ds:uri="http://schemas.microsoft.com/office/infopath/2007/PartnerControls"/>
+    <ds:schemaRef ds:uri="912cb619-99d2-4794-acea-8354d3da3f58"/>
+    <ds:schemaRef ds:uri="http://schemas.microsoft.com/office/2006/metadata/properties"/>
+    <ds:schemaRef ds:uri="http://purl.org/dc/elements/1.1/"/>
+  </ds:schemaRefs>
+</ds:datastoreItem>
+</file>
+
 <file path=customXml/itemProps3.xml><?xml version="1.0" encoding="utf-8"?>
 <ds:datastoreItem xmlns:ds="http://schemas.openxmlformats.org/officeDocument/2006/customXml" ds:itemID="{116A9811-A868-4FA1-96A7-0C195F67FCFD}">
   <ds:schemaRefs>

</xml_diff>